<commit_message>
Fix Streamlit caching and stabilize SBERT loading
</commit_message>
<xml_diff>
--- a/Presentation1.pptx
+++ b/Presentation1.pptx
@@ -5,13 +5,18 @@
     <p:sldMasterId id="2147483648" r:id="rId1"/>
   </p:sldMasterIdLst>
   <p:notesMasterIdLst>
-    <p:notesMasterId r:id="rId6"/>
+    <p:notesMasterId r:id="rId11"/>
   </p:notesMasterIdLst>
   <p:sldIdLst>
     <p:sldId id="256" r:id="rId2"/>
     <p:sldId id="257" r:id="rId3"/>
     <p:sldId id="259" r:id="rId4"/>
     <p:sldId id="258" r:id="rId5"/>
+    <p:sldId id="260" r:id="rId6"/>
+    <p:sldId id="261" r:id="rId7"/>
+    <p:sldId id="262" r:id="rId8"/>
+    <p:sldId id="263" r:id="rId9"/>
+    <p:sldId id="264" r:id="rId10"/>
   </p:sldIdLst>
   <p:sldSz cx="12192000" cy="6858000"/>
   <p:notesSz cx="6858000" cy="9144000"/>
@@ -110,6 +115,11 @@
       </a:defRPr>
     </a:lvl9pPr>
   </p:defaultTextStyle>
+  <p:extLst>
+    <p:ext uri="{EFAFB233-063F-42B5-8137-9DF3F51BA10A}">
+      <p15:sldGuideLst xmlns:p15="http://schemas.microsoft.com/office/powerpoint/2012/main"/>
+    </p:ext>
+  </p:extLst>
 </p:presentation>
 </file>
 
@@ -195,7 +205,7 @@
           <a:p>
             <a:fld id="{7C2C66D9-950C-CF4E-8BD0-075AA6720AFF}" type="datetimeFigureOut">
               <a:rPr lang="en-US" smtClean="0"/>
-              <a:t>2/3/26</a:t>
+              <a:t>2/4/26</a:t>
             </a:fld>
             <a:endParaRPr lang="en-US"/>
           </a:p>
@@ -696,7 +706,7 @@
           <a:p>
             <a:fld id="{C2237135-CEE8-B446-9ACB-3E8DC466E4F9}" type="datetimeFigureOut">
               <a:rPr lang="en-US" smtClean="0"/>
-              <a:t>2/3/26</a:t>
+              <a:t>2/4/26</a:t>
             </a:fld>
             <a:endParaRPr lang="en-US"/>
           </a:p>
@@ -896,7 +906,7 @@
           <a:p>
             <a:fld id="{C2237135-CEE8-B446-9ACB-3E8DC466E4F9}" type="datetimeFigureOut">
               <a:rPr lang="en-US" smtClean="0"/>
-              <a:t>2/3/26</a:t>
+              <a:t>2/4/26</a:t>
             </a:fld>
             <a:endParaRPr lang="en-US"/>
           </a:p>
@@ -1106,7 +1116,7 @@
           <a:p>
             <a:fld id="{C2237135-CEE8-B446-9ACB-3E8DC466E4F9}" type="datetimeFigureOut">
               <a:rPr lang="en-US" smtClean="0"/>
-              <a:t>2/3/26</a:t>
+              <a:t>2/4/26</a:t>
             </a:fld>
             <a:endParaRPr lang="en-US"/>
           </a:p>
@@ -1306,7 +1316,7 @@
           <a:p>
             <a:fld id="{C2237135-CEE8-B446-9ACB-3E8DC466E4F9}" type="datetimeFigureOut">
               <a:rPr lang="en-US" smtClean="0"/>
-              <a:t>2/3/26</a:t>
+              <a:t>2/4/26</a:t>
             </a:fld>
             <a:endParaRPr lang="en-US"/>
           </a:p>
@@ -1582,7 +1592,7 @@
           <a:p>
             <a:fld id="{C2237135-CEE8-B446-9ACB-3E8DC466E4F9}" type="datetimeFigureOut">
               <a:rPr lang="en-US" smtClean="0"/>
-              <a:t>2/3/26</a:t>
+              <a:t>2/4/26</a:t>
             </a:fld>
             <a:endParaRPr lang="en-US"/>
           </a:p>
@@ -1850,7 +1860,7 @@
           <a:p>
             <a:fld id="{C2237135-CEE8-B446-9ACB-3E8DC466E4F9}" type="datetimeFigureOut">
               <a:rPr lang="en-US" smtClean="0"/>
-              <a:t>2/3/26</a:t>
+              <a:t>2/4/26</a:t>
             </a:fld>
             <a:endParaRPr lang="en-US"/>
           </a:p>
@@ -2265,7 +2275,7 @@
           <a:p>
             <a:fld id="{C2237135-CEE8-B446-9ACB-3E8DC466E4F9}" type="datetimeFigureOut">
               <a:rPr lang="en-US" smtClean="0"/>
-              <a:t>2/3/26</a:t>
+              <a:t>2/4/26</a:t>
             </a:fld>
             <a:endParaRPr lang="en-US"/>
           </a:p>
@@ -2407,7 +2417,7 @@
           <a:p>
             <a:fld id="{C2237135-CEE8-B446-9ACB-3E8DC466E4F9}" type="datetimeFigureOut">
               <a:rPr lang="en-US" smtClean="0"/>
-              <a:t>2/3/26</a:t>
+              <a:t>2/4/26</a:t>
             </a:fld>
             <a:endParaRPr lang="en-US"/>
           </a:p>
@@ -2520,7 +2530,7 @@
           <a:p>
             <a:fld id="{C2237135-CEE8-B446-9ACB-3E8DC466E4F9}" type="datetimeFigureOut">
               <a:rPr lang="en-US" smtClean="0"/>
-              <a:t>2/3/26</a:t>
+              <a:t>2/4/26</a:t>
             </a:fld>
             <a:endParaRPr lang="en-US"/>
           </a:p>
@@ -2833,7 +2843,7 @@
           <a:p>
             <a:fld id="{C2237135-CEE8-B446-9ACB-3E8DC466E4F9}" type="datetimeFigureOut">
               <a:rPr lang="en-US" smtClean="0"/>
-              <a:t>2/3/26</a:t>
+              <a:t>2/4/26</a:t>
             </a:fld>
             <a:endParaRPr lang="en-US"/>
           </a:p>
@@ -3122,7 +3132,7 @@
           <a:p>
             <a:fld id="{C2237135-CEE8-B446-9ACB-3E8DC466E4F9}" type="datetimeFigureOut">
               <a:rPr lang="en-US" smtClean="0"/>
-              <a:t>2/3/26</a:t>
+              <a:t>2/4/26</a:t>
             </a:fld>
             <a:endParaRPr lang="en-US"/>
           </a:p>
@@ -3365,7 +3375,7 @@
           <a:p>
             <a:fld id="{C2237135-CEE8-B446-9ACB-3E8DC466E4F9}" type="datetimeFigureOut">
               <a:rPr lang="en-US" smtClean="0"/>
-              <a:t>2/3/26</a:t>
+              <a:t>2/4/26</a:t>
             </a:fld>
             <a:endParaRPr lang="en-US"/>
           </a:p>
@@ -6554,6 +6564,3425 @@
     <p:extLst>
       <p:ext uri="{BB962C8B-B14F-4D97-AF65-F5344CB8AC3E}">
         <p14:creationId xmlns:p14="http://schemas.microsoft.com/office/powerpoint/2010/main" val="1660429272"/>
+      </p:ext>
+    </p:extLst>
+  </p:cSld>
+  <p:clrMapOvr>
+    <a:masterClrMapping/>
+  </p:clrMapOvr>
+</p:sld>
+</file>
+
+<file path=ppt/slides/slide5.xml><?xml version="1.0" encoding="utf-8"?>
+<p:sld xmlns:a="http://schemas.openxmlformats.org/drawingml/2006/main" xmlns:r="http://schemas.openxmlformats.org/officeDocument/2006/relationships" xmlns:p="http://schemas.openxmlformats.org/presentationml/2006/main">
+  <p:cSld>
+    <p:spTree>
+      <p:nvGrpSpPr>
+        <p:cNvPr id="1" name="">
+          <a:extLst>
+            <a:ext uri="{FF2B5EF4-FFF2-40B4-BE49-F238E27FC236}">
+              <a16:creationId xmlns:a16="http://schemas.microsoft.com/office/drawing/2014/main" id="{A0F296B9-2FC4-1214-3EFE-D469887A209B}"/>
+            </a:ext>
+          </a:extLst>
+        </p:cNvPr>
+        <p:cNvGrpSpPr/>
+        <p:nvPr/>
+      </p:nvGrpSpPr>
+      <p:grpSpPr>
+        <a:xfrm>
+          <a:off x="0" y="0"/>
+          <a:ext cx="0" cy="0"/>
+          <a:chOff x="0" y="0"/>
+          <a:chExt cx="0" cy="0"/>
+        </a:xfrm>
+      </p:grpSpPr>
+      <p:sp>
+        <p:nvSpPr>
+          <p:cNvPr id="2" name="Title 1">
+            <a:extLst>
+              <a:ext uri="{FF2B5EF4-FFF2-40B4-BE49-F238E27FC236}">
+                <a16:creationId xmlns:a16="http://schemas.microsoft.com/office/drawing/2014/main" id="{808A6879-4558-CB3A-094E-4D3534C691A3}"/>
+              </a:ext>
+            </a:extLst>
+          </p:cNvPr>
+          <p:cNvSpPr>
+            <a:spLocks noGrp="1"/>
+          </p:cNvSpPr>
+          <p:nvPr>
+            <p:ph type="title"/>
+          </p:nvPr>
+        </p:nvSpPr>
+        <p:spPr/>
+        <p:txBody>
+          <a:bodyPr/>
+          <a:lstStyle/>
+          <a:p>
+            <a:r>
+              <a:rPr lang="en-IN" dirty="0">
+                <a:latin typeface="Times New Roman" panose="02020603050405020304" pitchFamily="18" charset="0"/>
+                <a:cs typeface="Times New Roman" panose="02020603050405020304" pitchFamily="18" charset="0"/>
+              </a:rPr>
+              <a:t>Match Score Design</a:t>
+            </a:r>
+            <a:endParaRPr lang="en-US" dirty="0">
+              <a:latin typeface="Times New Roman" panose="02020603050405020304" pitchFamily="18" charset="0"/>
+              <a:cs typeface="Times New Roman" panose="02020603050405020304" pitchFamily="18" charset="0"/>
+            </a:endParaRPr>
+          </a:p>
+        </p:txBody>
+      </p:sp>
+      <p:sp>
+        <p:nvSpPr>
+          <p:cNvPr id="3" name="Content Placeholder 2">
+            <a:extLst>
+              <a:ext uri="{FF2B5EF4-FFF2-40B4-BE49-F238E27FC236}">
+                <a16:creationId xmlns:a16="http://schemas.microsoft.com/office/drawing/2014/main" id="{78E5B793-7C28-B276-2E7B-35FA4F278882}"/>
+              </a:ext>
+            </a:extLst>
+          </p:cNvPr>
+          <p:cNvSpPr>
+            <a:spLocks noGrp="1"/>
+          </p:cNvSpPr>
+          <p:nvPr>
+            <p:ph idx="1"/>
+          </p:nvPr>
+        </p:nvSpPr>
+        <p:spPr>
+          <a:xfrm>
+            <a:off x="1008065" y="1798046"/>
+            <a:ext cx="2674248" cy="1941518"/>
+          </a:xfrm>
+        </p:spPr>
+        <p:txBody>
+          <a:bodyPr>
+            <a:noAutofit/>
+          </a:bodyPr>
+          <a:lstStyle/>
+          <a:p>
+            <a:r>
+              <a:rPr lang="en-IN" sz="1800" dirty="0">
+                <a:latin typeface="Times New Roman" panose="02020603050405020304" pitchFamily="18" charset="0"/>
+                <a:cs typeface="Times New Roman" panose="02020603050405020304" pitchFamily="18" charset="0"/>
+              </a:rPr>
+              <a:t>Match Score =</a:t>
+            </a:r>
+          </a:p>
+          <a:p>
+            <a:pPr marL="0" indent="0">
+              <a:buNone/>
+            </a:pPr>
+            <a:r>
+              <a:rPr lang="en-IN" sz="1800" dirty="0">
+                <a:latin typeface="Times New Roman" panose="02020603050405020304" pitchFamily="18" charset="0"/>
+                <a:cs typeface="Times New Roman" panose="02020603050405020304" pitchFamily="18" charset="0"/>
+              </a:rPr>
+              <a:t>    0.35 × Text Similarity</a:t>
+            </a:r>
+          </a:p>
+          <a:p>
+            <a:pPr marL="0" indent="0">
+              <a:buNone/>
+            </a:pPr>
+            <a:r>
+              <a:rPr lang="en-IN" sz="1800" dirty="0">
+                <a:latin typeface="Times New Roman" panose="02020603050405020304" pitchFamily="18" charset="0"/>
+                <a:cs typeface="Times New Roman" panose="02020603050405020304" pitchFamily="18" charset="0"/>
+              </a:rPr>
+              <a:t>    0.25 × Amenity Overlap</a:t>
+            </a:r>
+          </a:p>
+          <a:p>
+            <a:pPr marL="0" indent="0">
+              <a:buNone/>
+            </a:pPr>
+            <a:r>
+              <a:rPr lang="en-IN" sz="1800" dirty="0">
+                <a:latin typeface="Times New Roman" panose="02020603050405020304" pitchFamily="18" charset="0"/>
+                <a:cs typeface="Times New Roman" panose="02020603050405020304" pitchFamily="18" charset="0"/>
+              </a:rPr>
+              <a:t>    0.25 × Price Similarity</a:t>
+            </a:r>
+          </a:p>
+          <a:p>
+            <a:pPr marL="0" indent="0">
+              <a:buNone/>
+            </a:pPr>
+            <a:r>
+              <a:rPr lang="en-IN" sz="1800" dirty="0">
+                <a:latin typeface="Times New Roman" panose="02020603050405020304" pitchFamily="18" charset="0"/>
+                <a:cs typeface="Times New Roman" panose="02020603050405020304" pitchFamily="18" charset="0"/>
+              </a:rPr>
+              <a:t>    0.15 × Area Similarity</a:t>
+            </a:r>
+          </a:p>
+        </p:txBody>
+      </p:sp>
+      <p:sp>
+        <p:nvSpPr>
+          <p:cNvPr id="10" name="TextBox 9">
+            <a:extLst>
+              <a:ext uri="{FF2B5EF4-FFF2-40B4-BE49-F238E27FC236}">
+                <a16:creationId xmlns:a16="http://schemas.microsoft.com/office/drawing/2014/main" id="{10BFEE27-DC25-5E70-4017-FD0C49C82D20}"/>
+              </a:ext>
+            </a:extLst>
+          </p:cNvPr>
+          <p:cNvSpPr txBox="1"/>
+          <p:nvPr/>
+        </p:nvSpPr>
+        <p:spPr>
+          <a:xfrm>
+            <a:off x="886906" y="5788440"/>
+            <a:ext cx="10759634" cy="523220"/>
+          </a:xfrm>
+          <a:prstGeom prst="rect">
+            <a:avLst/>
+          </a:prstGeom>
+          <a:noFill/>
+        </p:spPr>
+        <p:txBody>
+          <a:bodyPr wrap="square" rtlCol="0">
+            <a:spAutoFit/>
+          </a:bodyPr>
+          <a:lstStyle/>
+          <a:p>
+            <a:r>
+              <a:rPr lang="en-IN" sz="1400" i="1" dirty="0">
+                <a:solidFill>
+                  <a:schemeClr val="tx1">
+                    <a:lumMod val="75000"/>
+                  </a:schemeClr>
+                </a:solidFill>
+                <a:latin typeface="Times New Roman" panose="02020603050405020304" pitchFamily="18" charset="0"/>
+                <a:cs typeface="Times New Roman" panose="02020603050405020304" pitchFamily="18" charset="0"/>
+              </a:rPr>
+              <a:t>Weights are business - tuneable, not learned.</a:t>
+            </a:r>
+          </a:p>
+          <a:p>
+            <a:r>
+              <a:rPr lang="en-IN" sz="1400" i="1" dirty="0">
+                <a:solidFill>
+                  <a:schemeClr val="tx1">
+                    <a:lumMod val="75000"/>
+                  </a:schemeClr>
+                </a:solidFill>
+                <a:latin typeface="Times New Roman" panose="02020603050405020304" pitchFamily="18" charset="0"/>
+                <a:cs typeface="Times New Roman" panose="02020603050405020304" pitchFamily="18" charset="0"/>
+              </a:rPr>
+              <a:t>Different markets or user segments may require different weightings</a:t>
+            </a:r>
+            <a:r>
+              <a:rPr lang="en-IN" sz="1200" i="1" dirty="0">
+                <a:solidFill>
+                  <a:schemeClr val="tx1">
+                    <a:lumMod val="75000"/>
+                  </a:schemeClr>
+                </a:solidFill>
+                <a:latin typeface="Times New Roman" panose="02020603050405020304" pitchFamily="18" charset="0"/>
+                <a:cs typeface="Times New Roman" panose="02020603050405020304" pitchFamily="18" charset="0"/>
+              </a:rPr>
+              <a:t>.</a:t>
+            </a:r>
+            <a:endParaRPr lang="en-US" sz="1200" i="1" dirty="0">
+              <a:solidFill>
+                <a:schemeClr val="tx1">
+                  <a:lumMod val="75000"/>
+                </a:schemeClr>
+              </a:solidFill>
+              <a:latin typeface="Times New Roman" panose="02020603050405020304" pitchFamily="18" charset="0"/>
+              <a:cs typeface="Times New Roman" panose="02020603050405020304" pitchFamily="18" charset="0"/>
+            </a:endParaRPr>
+          </a:p>
+        </p:txBody>
+      </p:sp>
+      <p:sp>
+        <p:nvSpPr>
+          <p:cNvPr id="4" name="Content Placeholder 2">
+            <a:extLst>
+              <a:ext uri="{FF2B5EF4-FFF2-40B4-BE49-F238E27FC236}">
+                <a16:creationId xmlns:a16="http://schemas.microsoft.com/office/drawing/2014/main" id="{4FF4A026-99C1-215D-6FD0-8EA1541C5279}"/>
+              </a:ext>
+            </a:extLst>
+          </p:cNvPr>
+          <p:cNvSpPr txBox="1">
+            <a:spLocks/>
+          </p:cNvSpPr>
+          <p:nvPr/>
+        </p:nvSpPr>
+        <p:spPr>
+          <a:xfrm>
+            <a:off x="3736849" y="2154204"/>
+            <a:ext cx="7616951" cy="1941518"/>
+          </a:xfrm>
+          <a:prstGeom prst="rect">
+            <a:avLst/>
+          </a:prstGeom>
+        </p:spPr>
+        <p:txBody>
+          <a:bodyPr vert="horz" lIns="91440" tIns="45720" rIns="91440" bIns="45720" rtlCol="0">
+            <a:noAutofit/>
+          </a:bodyPr>
+          <a:lstStyle>
+            <a:lvl1pPr marL="228600" indent="-228600" algn="l" defTabSz="914400" rtl="0" eaLnBrk="1" latinLnBrk="0" hangingPunct="1">
+              <a:lnSpc>
+                <a:spcPct val="90000"/>
+              </a:lnSpc>
+              <a:spcBef>
+                <a:spcPts val="1000"/>
+              </a:spcBef>
+              <a:buFont typeface="Arial" panose="020B0604020202020204" pitchFamily="34" charset="0"/>
+              <a:buChar char="•"/>
+              <a:defRPr sz="2800" kern="1200">
+                <a:solidFill>
+                  <a:schemeClr val="tx1"/>
+                </a:solidFill>
+                <a:latin typeface="+mn-lt"/>
+                <a:ea typeface="+mn-ea"/>
+                <a:cs typeface="+mn-cs"/>
+              </a:defRPr>
+            </a:lvl1pPr>
+            <a:lvl2pPr marL="685800" indent="-228600" algn="l" defTabSz="914400" rtl="0" eaLnBrk="1" latinLnBrk="0" hangingPunct="1">
+              <a:lnSpc>
+                <a:spcPct val="90000"/>
+              </a:lnSpc>
+              <a:spcBef>
+                <a:spcPts val="500"/>
+              </a:spcBef>
+              <a:buFont typeface="Arial" panose="020B0604020202020204" pitchFamily="34" charset="0"/>
+              <a:buChar char="•"/>
+              <a:defRPr sz="2400" kern="1200">
+                <a:solidFill>
+                  <a:schemeClr val="tx1"/>
+                </a:solidFill>
+                <a:latin typeface="+mn-lt"/>
+                <a:ea typeface="+mn-ea"/>
+                <a:cs typeface="+mn-cs"/>
+              </a:defRPr>
+            </a:lvl2pPr>
+            <a:lvl3pPr marL="1143000" indent="-228600" algn="l" defTabSz="914400" rtl="0" eaLnBrk="1" latinLnBrk="0" hangingPunct="1">
+              <a:lnSpc>
+                <a:spcPct val="90000"/>
+              </a:lnSpc>
+              <a:spcBef>
+                <a:spcPts val="500"/>
+              </a:spcBef>
+              <a:buFont typeface="Arial" panose="020B0604020202020204" pitchFamily="34" charset="0"/>
+              <a:buChar char="•"/>
+              <a:defRPr sz="2000" kern="1200">
+                <a:solidFill>
+                  <a:schemeClr val="tx1"/>
+                </a:solidFill>
+                <a:latin typeface="+mn-lt"/>
+                <a:ea typeface="+mn-ea"/>
+                <a:cs typeface="+mn-cs"/>
+              </a:defRPr>
+            </a:lvl3pPr>
+            <a:lvl4pPr marL="1600200" indent="-228600" algn="l" defTabSz="914400" rtl="0" eaLnBrk="1" latinLnBrk="0" hangingPunct="1">
+              <a:lnSpc>
+                <a:spcPct val="90000"/>
+              </a:lnSpc>
+              <a:spcBef>
+                <a:spcPts val="500"/>
+              </a:spcBef>
+              <a:buFont typeface="Arial" panose="020B0604020202020204" pitchFamily="34" charset="0"/>
+              <a:buChar char="•"/>
+              <a:defRPr sz="1800" kern="1200">
+                <a:solidFill>
+                  <a:schemeClr val="tx1"/>
+                </a:solidFill>
+                <a:latin typeface="+mn-lt"/>
+                <a:ea typeface="+mn-ea"/>
+                <a:cs typeface="+mn-cs"/>
+              </a:defRPr>
+            </a:lvl4pPr>
+            <a:lvl5pPr marL="2057400" indent="-228600" algn="l" defTabSz="914400" rtl="0" eaLnBrk="1" latinLnBrk="0" hangingPunct="1">
+              <a:lnSpc>
+                <a:spcPct val="90000"/>
+              </a:lnSpc>
+              <a:spcBef>
+                <a:spcPts val="500"/>
+              </a:spcBef>
+              <a:buFont typeface="Arial" panose="020B0604020202020204" pitchFamily="34" charset="0"/>
+              <a:buChar char="•"/>
+              <a:defRPr sz="1800" kern="1200">
+                <a:solidFill>
+                  <a:schemeClr val="tx1"/>
+                </a:solidFill>
+                <a:latin typeface="+mn-lt"/>
+                <a:ea typeface="+mn-ea"/>
+                <a:cs typeface="+mn-cs"/>
+              </a:defRPr>
+            </a:lvl5pPr>
+            <a:lvl6pPr marL="2514600" indent="-228600" algn="l" defTabSz="914400" rtl="0" eaLnBrk="1" latinLnBrk="0" hangingPunct="1">
+              <a:lnSpc>
+                <a:spcPct val="90000"/>
+              </a:lnSpc>
+              <a:spcBef>
+                <a:spcPts val="500"/>
+              </a:spcBef>
+              <a:buFont typeface="Arial" panose="020B0604020202020204" pitchFamily="34" charset="0"/>
+              <a:buChar char="•"/>
+              <a:defRPr sz="1800" kern="1200">
+                <a:solidFill>
+                  <a:schemeClr val="tx1"/>
+                </a:solidFill>
+                <a:latin typeface="+mn-lt"/>
+                <a:ea typeface="+mn-ea"/>
+                <a:cs typeface="+mn-cs"/>
+              </a:defRPr>
+            </a:lvl6pPr>
+            <a:lvl7pPr marL="2971800" indent="-228600" algn="l" defTabSz="914400" rtl="0" eaLnBrk="1" latinLnBrk="0" hangingPunct="1">
+              <a:lnSpc>
+                <a:spcPct val="90000"/>
+              </a:lnSpc>
+              <a:spcBef>
+                <a:spcPts val="500"/>
+              </a:spcBef>
+              <a:buFont typeface="Arial" panose="020B0604020202020204" pitchFamily="34" charset="0"/>
+              <a:buChar char="•"/>
+              <a:defRPr sz="1800" kern="1200">
+                <a:solidFill>
+                  <a:schemeClr val="tx1"/>
+                </a:solidFill>
+                <a:latin typeface="+mn-lt"/>
+                <a:ea typeface="+mn-ea"/>
+                <a:cs typeface="+mn-cs"/>
+              </a:defRPr>
+            </a:lvl7pPr>
+            <a:lvl8pPr marL="3429000" indent="-228600" algn="l" defTabSz="914400" rtl="0" eaLnBrk="1" latinLnBrk="0" hangingPunct="1">
+              <a:lnSpc>
+                <a:spcPct val="90000"/>
+              </a:lnSpc>
+              <a:spcBef>
+                <a:spcPts val="500"/>
+              </a:spcBef>
+              <a:buFont typeface="Arial" panose="020B0604020202020204" pitchFamily="34" charset="0"/>
+              <a:buChar char="•"/>
+              <a:defRPr sz="1800" kern="1200">
+                <a:solidFill>
+                  <a:schemeClr val="tx1"/>
+                </a:solidFill>
+                <a:latin typeface="+mn-lt"/>
+                <a:ea typeface="+mn-ea"/>
+                <a:cs typeface="+mn-cs"/>
+              </a:defRPr>
+            </a:lvl8pPr>
+            <a:lvl9pPr marL="3886200" indent="-228600" algn="l" defTabSz="914400" rtl="0" eaLnBrk="1" latinLnBrk="0" hangingPunct="1">
+              <a:lnSpc>
+                <a:spcPct val="90000"/>
+              </a:lnSpc>
+              <a:spcBef>
+                <a:spcPts val="500"/>
+              </a:spcBef>
+              <a:buFont typeface="Arial" panose="020B0604020202020204" pitchFamily="34" charset="0"/>
+              <a:buChar char="•"/>
+              <a:defRPr sz="1800" kern="1200">
+                <a:solidFill>
+                  <a:schemeClr val="tx1"/>
+                </a:solidFill>
+                <a:latin typeface="+mn-lt"/>
+                <a:ea typeface="+mn-ea"/>
+                <a:cs typeface="+mn-cs"/>
+              </a:defRPr>
+            </a:lvl9pPr>
+          </a:lstStyle>
+          <a:p>
+            <a:pPr marL="0" indent="0">
+              <a:buNone/>
+            </a:pPr>
+            <a:r>
+              <a:rPr lang="en-IN" sz="1800" dirty="0">
+                <a:latin typeface="Times New Roman" panose="02020603050405020304" pitchFamily="18" charset="0"/>
+                <a:cs typeface="Times New Roman" panose="02020603050405020304" pitchFamily="18" charset="0"/>
+              </a:rPr>
+              <a:t>→ Captures user intent and lifestyle preferences</a:t>
+            </a:r>
+          </a:p>
+          <a:p>
+            <a:pPr marL="0" indent="0">
+              <a:buNone/>
+            </a:pPr>
+            <a:r>
+              <a:rPr lang="en-IN" sz="1800" dirty="0">
+                <a:latin typeface="Times New Roman" panose="02020603050405020304" pitchFamily="18" charset="0"/>
+                <a:cs typeface="Times New Roman" panose="02020603050405020304" pitchFamily="18" charset="0"/>
+              </a:rPr>
+              <a:t>→ Reflect explicit, conscious requirements</a:t>
+            </a:r>
+          </a:p>
+          <a:p>
+            <a:pPr marL="0" indent="0">
+              <a:buNone/>
+            </a:pPr>
+            <a:r>
+              <a:rPr lang="en-IN" sz="1800" dirty="0">
+                <a:latin typeface="Times New Roman" panose="02020603050405020304" pitchFamily="18" charset="0"/>
+                <a:cs typeface="Times New Roman" panose="02020603050405020304" pitchFamily="18" charset="0"/>
+              </a:rPr>
+              <a:t>→ Acts as feasibility signal and soft ranking constraint</a:t>
+            </a:r>
+          </a:p>
+          <a:p>
+            <a:pPr marL="0" indent="0">
+              <a:buNone/>
+            </a:pPr>
+            <a:r>
+              <a:rPr lang="en-IN" sz="1800" dirty="0">
+                <a:latin typeface="Times New Roman" panose="02020603050405020304" pitchFamily="18" charset="0"/>
+                <a:cs typeface="Times New Roman" panose="02020603050405020304" pitchFamily="18" charset="0"/>
+              </a:rPr>
+              <a:t>→ Provides context but weakly predicts desirability</a:t>
+            </a:r>
+          </a:p>
+        </p:txBody>
+      </p:sp>
+    </p:spTree>
+    <p:extLst>
+      <p:ext uri="{BB962C8B-B14F-4D97-AF65-F5344CB8AC3E}">
+        <p14:creationId xmlns:p14="http://schemas.microsoft.com/office/powerpoint/2010/main" val="991903305"/>
+      </p:ext>
+    </p:extLst>
+  </p:cSld>
+  <p:clrMapOvr>
+    <a:masterClrMapping/>
+  </p:clrMapOvr>
+</p:sld>
+</file>
+
+<file path=ppt/slides/slide6.xml><?xml version="1.0" encoding="utf-8"?>
+<p:sld xmlns:a="http://schemas.openxmlformats.org/drawingml/2006/main" xmlns:r="http://schemas.openxmlformats.org/officeDocument/2006/relationships" xmlns:p="http://schemas.openxmlformats.org/presentationml/2006/main">
+  <p:cSld>
+    <p:spTree>
+      <p:nvGrpSpPr>
+        <p:cNvPr id="1" name="">
+          <a:extLst>
+            <a:ext uri="{FF2B5EF4-FFF2-40B4-BE49-F238E27FC236}">
+              <a16:creationId xmlns:a16="http://schemas.microsoft.com/office/drawing/2014/main" id="{6D87FB48-57C9-8ABA-72EB-E52DE7CBDD90}"/>
+            </a:ext>
+          </a:extLst>
+        </p:cNvPr>
+        <p:cNvGrpSpPr/>
+        <p:nvPr/>
+      </p:nvGrpSpPr>
+      <p:grpSpPr>
+        <a:xfrm>
+          <a:off x="0" y="0"/>
+          <a:ext cx="0" cy="0"/>
+          <a:chOff x="0" y="0"/>
+          <a:chExt cx="0" cy="0"/>
+        </a:xfrm>
+      </p:grpSpPr>
+      <p:sp>
+        <p:nvSpPr>
+          <p:cNvPr id="2" name="Title 1">
+            <a:extLst>
+              <a:ext uri="{FF2B5EF4-FFF2-40B4-BE49-F238E27FC236}">
+                <a16:creationId xmlns:a16="http://schemas.microsoft.com/office/drawing/2014/main" id="{F814A36D-D91A-D4E3-02AD-A0BDCF8D28E1}"/>
+              </a:ext>
+            </a:extLst>
+          </p:cNvPr>
+          <p:cNvSpPr>
+            <a:spLocks noGrp="1"/>
+          </p:cNvSpPr>
+          <p:nvPr>
+            <p:ph type="title"/>
+          </p:nvPr>
+        </p:nvSpPr>
+        <p:spPr/>
+        <p:txBody>
+          <a:bodyPr/>
+          <a:lstStyle/>
+          <a:p>
+            <a:r>
+              <a:rPr lang="en-IN" dirty="0">
+                <a:latin typeface="Times New Roman" panose="02020603050405020304" pitchFamily="18" charset="0"/>
+                <a:cs typeface="Times New Roman" panose="02020603050405020304" pitchFamily="18" charset="0"/>
+              </a:rPr>
+              <a:t>AI/ML Choices</a:t>
+            </a:r>
+            <a:endParaRPr lang="en-US" dirty="0">
+              <a:latin typeface="Times New Roman" panose="02020603050405020304" pitchFamily="18" charset="0"/>
+              <a:cs typeface="Times New Roman" panose="02020603050405020304" pitchFamily="18" charset="0"/>
+            </a:endParaRPr>
+          </a:p>
+        </p:txBody>
+      </p:sp>
+      <p:sp>
+        <p:nvSpPr>
+          <p:cNvPr id="3" name="Content Placeholder 2">
+            <a:extLst>
+              <a:ext uri="{FF2B5EF4-FFF2-40B4-BE49-F238E27FC236}">
+                <a16:creationId xmlns:a16="http://schemas.microsoft.com/office/drawing/2014/main" id="{0A10B1D7-B358-5413-BF4B-08614834978C}"/>
+              </a:ext>
+            </a:extLst>
+          </p:cNvPr>
+          <p:cNvSpPr>
+            <a:spLocks noGrp="1"/>
+          </p:cNvSpPr>
+          <p:nvPr>
+            <p:ph idx="1"/>
+          </p:nvPr>
+        </p:nvSpPr>
+        <p:spPr>
+          <a:xfrm>
+            <a:off x="838200" y="1798046"/>
+            <a:ext cx="10515600" cy="2551532"/>
+          </a:xfrm>
+        </p:spPr>
+        <p:txBody>
+          <a:bodyPr>
+            <a:noAutofit/>
+          </a:bodyPr>
+          <a:lstStyle/>
+          <a:p>
+            <a:r>
+              <a:rPr lang="en-IN" sz="1800" dirty="0">
+                <a:latin typeface="Times New Roman" panose="02020603050405020304" pitchFamily="18" charset="0"/>
+                <a:cs typeface="Times New Roman" panose="02020603050405020304" pitchFamily="18" charset="0"/>
+              </a:rPr>
+              <a:t>Sentence-BERT (all-MiniLM-L6-v2)</a:t>
+            </a:r>
+          </a:p>
+          <a:p>
+            <a:r>
+              <a:rPr lang="en-IN" sz="1800" dirty="0">
+                <a:latin typeface="Times New Roman" panose="02020603050405020304" pitchFamily="18" charset="0"/>
+                <a:cs typeface="Times New Roman" panose="02020603050405020304" pitchFamily="18" charset="0"/>
+              </a:rPr>
+              <a:t>Cosine Similarity</a:t>
+            </a:r>
+          </a:p>
+          <a:p>
+            <a:r>
+              <a:rPr lang="en-IN" sz="1800" dirty="0">
+                <a:latin typeface="Times New Roman" panose="02020603050405020304" pitchFamily="18" charset="0"/>
+                <a:cs typeface="Times New Roman" panose="02020603050405020304" pitchFamily="18" charset="0"/>
+              </a:rPr>
+              <a:t>Rule-based Amenity Extraction</a:t>
+            </a:r>
+          </a:p>
+          <a:p>
+            <a:endParaRPr lang="en-IN" sz="1800" dirty="0">
+              <a:latin typeface="Times New Roman" panose="02020603050405020304" pitchFamily="18" charset="0"/>
+              <a:cs typeface="Times New Roman" panose="02020603050405020304" pitchFamily="18" charset="0"/>
+            </a:endParaRPr>
+          </a:p>
+          <a:p>
+            <a:pPr marL="0" indent="0">
+              <a:buNone/>
+            </a:pPr>
+            <a:r>
+              <a:rPr lang="en-IN" sz="1800" dirty="0">
+                <a:latin typeface="Times New Roman" panose="02020603050405020304" pitchFamily="18" charset="0"/>
+                <a:cs typeface="Times New Roman" panose="02020603050405020304" pitchFamily="18" charset="0"/>
+              </a:rPr>
+              <a:t>Pretrained embeddings capture semantic intent without requiring labelled data.</a:t>
+            </a:r>
+          </a:p>
+          <a:p>
+            <a:pPr marL="0" indent="0">
+              <a:buNone/>
+            </a:pPr>
+            <a:r>
+              <a:rPr lang="en-IN" sz="1800" dirty="0">
+                <a:latin typeface="Times New Roman" panose="02020603050405020304" pitchFamily="18" charset="0"/>
+                <a:cs typeface="Times New Roman" panose="02020603050405020304" pitchFamily="18" charset="0"/>
+              </a:rPr>
+              <a:t>This avoids training instability and improves </a:t>
+            </a:r>
+            <a:r>
+              <a:rPr lang="en-IN" sz="1800" dirty="0" err="1">
+                <a:latin typeface="Times New Roman" panose="02020603050405020304" pitchFamily="18" charset="0"/>
+                <a:cs typeface="Times New Roman" panose="02020603050405020304" pitchFamily="18" charset="0"/>
+              </a:rPr>
+              <a:t>explainability</a:t>
+            </a:r>
+            <a:r>
+              <a:rPr lang="en-IN" sz="1800" dirty="0">
+                <a:latin typeface="Times New Roman" panose="02020603050405020304" pitchFamily="18" charset="0"/>
+                <a:cs typeface="Times New Roman" panose="02020603050405020304" pitchFamily="18" charset="0"/>
+              </a:rPr>
+              <a:t> in a noisy, preference-driven domain.</a:t>
+            </a:r>
+          </a:p>
+        </p:txBody>
+      </p:sp>
+    </p:spTree>
+    <p:extLst>
+      <p:ext uri="{BB962C8B-B14F-4D97-AF65-F5344CB8AC3E}">
+        <p14:creationId xmlns:p14="http://schemas.microsoft.com/office/powerpoint/2010/main" val="2112870396"/>
+      </p:ext>
+    </p:extLst>
+  </p:cSld>
+  <p:clrMapOvr>
+    <a:masterClrMapping/>
+  </p:clrMapOvr>
+</p:sld>
+</file>
+
+<file path=ppt/slides/slide7.xml><?xml version="1.0" encoding="utf-8"?>
+<p:sld xmlns:a="http://schemas.openxmlformats.org/drawingml/2006/main" xmlns:r="http://schemas.openxmlformats.org/officeDocument/2006/relationships" xmlns:p="http://schemas.openxmlformats.org/presentationml/2006/main">
+  <p:cSld>
+    <p:spTree>
+      <p:nvGrpSpPr>
+        <p:cNvPr id="1" name="">
+          <a:extLst>
+            <a:ext uri="{FF2B5EF4-FFF2-40B4-BE49-F238E27FC236}">
+              <a16:creationId xmlns:a16="http://schemas.microsoft.com/office/drawing/2014/main" id="{DA948A0F-6F06-D900-6177-7C755AAF17BB}"/>
+            </a:ext>
+          </a:extLst>
+        </p:cNvPr>
+        <p:cNvGrpSpPr/>
+        <p:nvPr/>
+      </p:nvGrpSpPr>
+      <p:grpSpPr>
+        <a:xfrm>
+          <a:off x="0" y="0"/>
+          <a:ext cx="0" cy="0"/>
+          <a:chOff x="0" y="0"/>
+          <a:chExt cx="0" cy="0"/>
+        </a:xfrm>
+      </p:grpSpPr>
+      <p:sp>
+        <p:nvSpPr>
+          <p:cNvPr id="2" name="Title 1">
+            <a:extLst>
+              <a:ext uri="{FF2B5EF4-FFF2-40B4-BE49-F238E27FC236}">
+                <a16:creationId xmlns:a16="http://schemas.microsoft.com/office/drawing/2014/main" id="{0D22C813-55BE-DA06-0090-5C8395240F35}"/>
+              </a:ext>
+            </a:extLst>
+          </p:cNvPr>
+          <p:cNvSpPr>
+            <a:spLocks noGrp="1"/>
+          </p:cNvSpPr>
+          <p:nvPr>
+            <p:ph type="title"/>
+          </p:nvPr>
+        </p:nvSpPr>
+        <p:spPr/>
+        <p:txBody>
+          <a:bodyPr/>
+          <a:lstStyle/>
+          <a:p>
+            <a:r>
+              <a:rPr lang="en-IN" dirty="0">
+                <a:latin typeface="Times New Roman" panose="02020603050405020304" pitchFamily="18" charset="0"/>
+                <a:cs typeface="Times New Roman" panose="02020603050405020304" pitchFamily="18" charset="0"/>
+              </a:rPr>
+              <a:t>Example Recommendation &amp; </a:t>
+            </a:r>
+            <a:r>
+              <a:rPr lang="en-IN" dirty="0" err="1">
+                <a:latin typeface="Times New Roman" panose="02020603050405020304" pitchFamily="18" charset="0"/>
+                <a:cs typeface="Times New Roman" panose="02020603050405020304" pitchFamily="18" charset="0"/>
+              </a:rPr>
+              <a:t>Explainability</a:t>
+            </a:r>
+            <a:endParaRPr lang="en-US" dirty="0">
+              <a:latin typeface="Times New Roman" panose="02020603050405020304" pitchFamily="18" charset="0"/>
+              <a:cs typeface="Times New Roman" panose="02020603050405020304" pitchFamily="18" charset="0"/>
+            </a:endParaRPr>
+          </a:p>
+        </p:txBody>
+      </p:sp>
+      <p:sp>
+        <p:nvSpPr>
+          <p:cNvPr id="3" name="Content Placeholder 2">
+            <a:extLst>
+              <a:ext uri="{FF2B5EF4-FFF2-40B4-BE49-F238E27FC236}">
+                <a16:creationId xmlns:a16="http://schemas.microsoft.com/office/drawing/2014/main" id="{CBA49A0B-F9CD-FE03-C630-B466EE4DD179}"/>
+              </a:ext>
+            </a:extLst>
+          </p:cNvPr>
+          <p:cNvSpPr>
+            <a:spLocks noGrp="1"/>
+          </p:cNvSpPr>
+          <p:nvPr>
+            <p:ph idx="1"/>
+          </p:nvPr>
+        </p:nvSpPr>
+        <p:spPr>
+          <a:xfrm>
+            <a:off x="946150" y="4846320"/>
+            <a:ext cx="3594100" cy="1024128"/>
+          </a:xfrm>
+        </p:spPr>
+        <p:txBody>
+          <a:bodyPr>
+            <a:noAutofit/>
+          </a:bodyPr>
+          <a:lstStyle/>
+          <a:p>
+            <a:r>
+              <a:rPr lang="en-IN" sz="1600" dirty="0">
+                <a:latin typeface="Times New Roman" panose="02020603050405020304" pitchFamily="18" charset="0"/>
+                <a:cs typeface="Times New Roman" panose="02020603050405020304" pitchFamily="18" charset="0"/>
+              </a:rPr>
+              <a:t>For a sample user, the system ranks feasible properties based on overall alignment.</a:t>
+            </a:r>
+          </a:p>
+        </p:txBody>
+      </p:sp>
+      <p:pic>
+        <p:nvPicPr>
+          <p:cNvPr id="4" name="Picture 3">
+            <a:extLst>
+              <a:ext uri="{FF2B5EF4-FFF2-40B4-BE49-F238E27FC236}">
+                <a16:creationId xmlns:a16="http://schemas.microsoft.com/office/drawing/2014/main" id="{02BFDAD0-F5CC-B975-0398-255F5A0737E0}"/>
+              </a:ext>
+            </a:extLst>
+          </p:cNvPr>
+          <p:cNvPicPr>
+            <a:picLocks noChangeAspect="1"/>
+          </p:cNvPicPr>
+          <p:nvPr/>
+        </p:nvPicPr>
+        <p:blipFill>
+          <a:blip r:embed="rId2"/>
+          <a:stretch>
+            <a:fillRect/>
+          </a:stretch>
+        </p:blipFill>
+        <p:spPr>
+          <a:xfrm>
+            <a:off x="5255191" y="1631778"/>
+            <a:ext cx="3638873" cy="2882900"/>
+          </a:xfrm>
+          <a:prstGeom prst="rect">
+            <a:avLst/>
+          </a:prstGeom>
+        </p:spPr>
+      </p:pic>
+      <p:pic>
+        <p:nvPicPr>
+          <p:cNvPr id="5" name="Picture 4">
+            <a:extLst>
+              <a:ext uri="{FF2B5EF4-FFF2-40B4-BE49-F238E27FC236}">
+                <a16:creationId xmlns:a16="http://schemas.microsoft.com/office/drawing/2014/main" id="{F0C2DD68-4AEC-03FF-25A8-7F8E05DB1735}"/>
+              </a:ext>
+            </a:extLst>
+          </p:cNvPr>
+          <p:cNvPicPr>
+            <a:picLocks noChangeAspect="1"/>
+          </p:cNvPicPr>
+          <p:nvPr/>
+        </p:nvPicPr>
+        <p:blipFill>
+          <a:blip r:embed="rId3"/>
+          <a:stretch>
+            <a:fillRect/>
+          </a:stretch>
+        </p:blipFill>
+        <p:spPr>
+          <a:xfrm>
+            <a:off x="946150" y="1631778"/>
+            <a:ext cx="3594100" cy="2882900"/>
+          </a:xfrm>
+          <a:prstGeom prst="rect">
+            <a:avLst/>
+          </a:prstGeom>
+        </p:spPr>
+      </p:pic>
+      <p:sp>
+        <p:nvSpPr>
+          <p:cNvPr id="6" name="Content Placeholder 2">
+            <a:extLst>
+              <a:ext uri="{FF2B5EF4-FFF2-40B4-BE49-F238E27FC236}">
+                <a16:creationId xmlns:a16="http://schemas.microsoft.com/office/drawing/2014/main" id="{2DB439BA-FD3E-AB36-518E-DA88BA96A933}"/>
+              </a:ext>
+            </a:extLst>
+          </p:cNvPr>
+          <p:cNvSpPr txBox="1">
+            <a:spLocks/>
+          </p:cNvSpPr>
+          <p:nvPr/>
+        </p:nvSpPr>
+        <p:spPr>
+          <a:xfrm>
+            <a:off x="5074920" y="4679632"/>
+            <a:ext cx="6278880" cy="2001584"/>
+          </a:xfrm>
+          <a:prstGeom prst="rect">
+            <a:avLst/>
+          </a:prstGeom>
+        </p:spPr>
+        <p:txBody>
+          <a:bodyPr vert="horz" lIns="91440" tIns="45720" rIns="91440" bIns="45720" rtlCol="0">
+            <a:noAutofit/>
+          </a:bodyPr>
+          <a:lstStyle>
+            <a:lvl1pPr marL="228600" indent="-228600" algn="l" defTabSz="914400" rtl="0" eaLnBrk="1" latinLnBrk="0" hangingPunct="1">
+              <a:lnSpc>
+                <a:spcPct val="90000"/>
+              </a:lnSpc>
+              <a:spcBef>
+                <a:spcPts val="1000"/>
+              </a:spcBef>
+              <a:buFont typeface="Arial" panose="020B0604020202020204" pitchFamily="34" charset="0"/>
+              <a:buChar char="•"/>
+              <a:defRPr sz="2800" kern="1200">
+                <a:solidFill>
+                  <a:schemeClr val="tx1"/>
+                </a:solidFill>
+                <a:latin typeface="+mn-lt"/>
+                <a:ea typeface="+mn-ea"/>
+                <a:cs typeface="+mn-cs"/>
+              </a:defRPr>
+            </a:lvl1pPr>
+            <a:lvl2pPr marL="685800" indent="-228600" algn="l" defTabSz="914400" rtl="0" eaLnBrk="1" latinLnBrk="0" hangingPunct="1">
+              <a:lnSpc>
+                <a:spcPct val="90000"/>
+              </a:lnSpc>
+              <a:spcBef>
+                <a:spcPts val="500"/>
+              </a:spcBef>
+              <a:buFont typeface="Arial" panose="020B0604020202020204" pitchFamily="34" charset="0"/>
+              <a:buChar char="•"/>
+              <a:defRPr sz="2400" kern="1200">
+                <a:solidFill>
+                  <a:schemeClr val="tx1"/>
+                </a:solidFill>
+                <a:latin typeface="+mn-lt"/>
+                <a:ea typeface="+mn-ea"/>
+                <a:cs typeface="+mn-cs"/>
+              </a:defRPr>
+            </a:lvl2pPr>
+            <a:lvl3pPr marL="1143000" indent="-228600" algn="l" defTabSz="914400" rtl="0" eaLnBrk="1" latinLnBrk="0" hangingPunct="1">
+              <a:lnSpc>
+                <a:spcPct val="90000"/>
+              </a:lnSpc>
+              <a:spcBef>
+                <a:spcPts val="500"/>
+              </a:spcBef>
+              <a:buFont typeface="Arial" panose="020B0604020202020204" pitchFamily="34" charset="0"/>
+              <a:buChar char="•"/>
+              <a:defRPr sz="2000" kern="1200">
+                <a:solidFill>
+                  <a:schemeClr val="tx1"/>
+                </a:solidFill>
+                <a:latin typeface="+mn-lt"/>
+                <a:ea typeface="+mn-ea"/>
+                <a:cs typeface="+mn-cs"/>
+              </a:defRPr>
+            </a:lvl3pPr>
+            <a:lvl4pPr marL="1600200" indent="-228600" algn="l" defTabSz="914400" rtl="0" eaLnBrk="1" latinLnBrk="0" hangingPunct="1">
+              <a:lnSpc>
+                <a:spcPct val="90000"/>
+              </a:lnSpc>
+              <a:spcBef>
+                <a:spcPts val="500"/>
+              </a:spcBef>
+              <a:buFont typeface="Arial" panose="020B0604020202020204" pitchFamily="34" charset="0"/>
+              <a:buChar char="•"/>
+              <a:defRPr sz="1800" kern="1200">
+                <a:solidFill>
+                  <a:schemeClr val="tx1"/>
+                </a:solidFill>
+                <a:latin typeface="+mn-lt"/>
+                <a:ea typeface="+mn-ea"/>
+                <a:cs typeface="+mn-cs"/>
+              </a:defRPr>
+            </a:lvl4pPr>
+            <a:lvl5pPr marL="2057400" indent="-228600" algn="l" defTabSz="914400" rtl="0" eaLnBrk="1" latinLnBrk="0" hangingPunct="1">
+              <a:lnSpc>
+                <a:spcPct val="90000"/>
+              </a:lnSpc>
+              <a:spcBef>
+                <a:spcPts val="500"/>
+              </a:spcBef>
+              <a:buFont typeface="Arial" panose="020B0604020202020204" pitchFamily="34" charset="0"/>
+              <a:buChar char="•"/>
+              <a:defRPr sz="1800" kern="1200">
+                <a:solidFill>
+                  <a:schemeClr val="tx1"/>
+                </a:solidFill>
+                <a:latin typeface="+mn-lt"/>
+                <a:ea typeface="+mn-ea"/>
+                <a:cs typeface="+mn-cs"/>
+              </a:defRPr>
+            </a:lvl5pPr>
+            <a:lvl6pPr marL="2514600" indent="-228600" algn="l" defTabSz="914400" rtl="0" eaLnBrk="1" latinLnBrk="0" hangingPunct="1">
+              <a:lnSpc>
+                <a:spcPct val="90000"/>
+              </a:lnSpc>
+              <a:spcBef>
+                <a:spcPts val="500"/>
+              </a:spcBef>
+              <a:buFont typeface="Arial" panose="020B0604020202020204" pitchFamily="34" charset="0"/>
+              <a:buChar char="•"/>
+              <a:defRPr sz="1800" kern="1200">
+                <a:solidFill>
+                  <a:schemeClr val="tx1"/>
+                </a:solidFill>
+                <a:latin typeface="+mn-lt"/>
+                <a:ea typeface="+mn-ea"/>
+                <a:cs typeface="+mn-cs"/>
+              </a:defRPr>
+            </a:lvl6pPr>
+            <a:lvl7pPr marL="2971800" indent="-228600" algn="l" defTabSz="914400" rtl="0" eaLnBrk="1" latinLnBrk="0" hangingPunct="1">
+              <a:lnSpc>
+                <a:spcPct val="90000"/>
+              </a:lnSpc>
+              <a:spcBef>
+                <a:spcPts val="500"/>
+              </a:spcBef>
+              <a:buFont typeface="Arial" panose="020B0604020202020204" pitchFamily="34" charset="0"/>
+              <a:buChar char="•"/>
+              <a:defRPr sz="1800" kern="1200">
+                <a:solidFill>
+                  <a:schemeClr val="tx1"/>
+                </a:solidFill>
+                <a:latin typeface="+mn-lt"/>
+                <a:ea typeface="+mn-ea"/>
+                <a:cs typeface="+mn-cs"/>
+              </a:defRPr>
+            </a:lvl7pPr>
+            <a:lvl8pPr marL="3429000" indent="-228600" algn="l" defTabSz="914400" rtl="0" eaLnBrk="1" latinLnBrk="0" hangingPunct="1">
+              <a:lnSpc>
+                <a:spcPct val="90000"/>
+              </a:lnSpc>
+              <a:spcBef>
+                <a:spcPts val="500"/>
+              </a:spcBef>
+              <a:buFont typeface="Arial" panose="020B0604020202020204" pitchFamily="34" charset="0"/>
+              <a:buChar char="•"/>
+              <a:defRPr sz="1800" kern="1200">
+                <a:solidFill>
+                  <a:schemeClr val="tx1"/>
+                </a:solidFill>
+                <a:latin typeface="+mn-lt"/>
+                <a:ea typeface="+mn-ea"/>
+                <a:cs typeface="+mn-cs"/>
+              </a:defRPr>
+            </a:lvl8pPr>
+            <a:lvl9pPr marL="3886200" indent="-228600" algn="l" defTabSz="914400" rtl="0" eaLnBrk="1" latinLnBrk="0" hangingPunct="1">
+              <a:lnSpc>
+                <a:spcPct val="90000"/>
+              </a:lnSpc>
+              <a:spcBef>
+                <a:spcPts val="500"/>
+              </a:spcBef>
+              <a:buFont typeface="Arial" panose="020B0604020202020204" pitchFamily="34" charset="0"/>
+              <a:buChar char="•"/>
+              <a:defRPr sz="1800" kern="1200">
+                <a:solidFill>
+                  <a:schemeClr val="tx1"/>
+                </a:solidFill>
+                <a:latin typeface="+mn-lt"/>
+                <a:ea typeface="+mn-ea"/>
+                <a:cs typeface="+mn-cs"/>
+              </a:defRPr>
+            </a:lvl9pPr>
+          </a:lstStyle>
+          <a:p>
+            <a:pPr marL="0" indent="0">
+              <a:buNone/>
+            </a:pPr>
+            <a:r>
+              <a:rPr lang="en-IN" sz="1600" b="1" dirty="0">
+                <a:latin typeface="Times New Roman" panose="02020603050405020304" pitchFamily="18" charset="0"/>
+                <a:cs typeface="Times New Roman" panose="02020603050405020304" pitchFamily="18" charset="0"/>
+              </a:rPr>
+              <a:t>1.  Area is consistently acceptable</a:t>
+            </a:r>
+          </a:p>
+          <a:p>
+            <a:pPr marL="0" indent="0">
+              <a:buNone/>
+            </a:pPr>
+            <a:r>
+              <a:rPr lang="en-IN" sz="1200" dirty="0">
+                <a:latin typeface="Times New Roman" panose="02020603050405020304" pitchFamily="18" charset="0"/>
+                <a:cs typeface="Times New Roman" panose="02020603050405020304" pitchFamily="18" charset="0"/>
+              </a:rPr>
+              <a:t>-     Area similarity is high across all top matches, so it doesn’t drive ranking.</a:t>
+            </a:r>
+          </a:p>
+          <a:p>
+            <a:pPr marL="0" indent="0">
+              <a:buNone/>
+            </a:pPr>
+            <a:r>
+              <a:rPr lang="en-IN" sz="1600" b="1" dirty="0">
+                <a:latin typeface="Times New Roman" panose="02020603050405020304" pitchFamily="18" charset="0"/>
+                <a:cs typeface="Times New Roman" panose="02020603050405020304" pitchFamily="18" charset="0"/>
+              </a:rPr>
+              <a:t>2.  Price and amenities create separation</a:t>
+            </a:r>
+          </a:p>
+          <a:p>
+            <a:pPr marL="0" indent="0">
+              <a:buNone/>
+            </a:pPr>
+            <a:r>
+              <a:rPr lang="en-IN" sz="1200" dirty="0">
+                <a:latin typeface="Times New Roman" panose="02020603050405020304" pitchFamily="18" charset="0"/>
+                <a:cs typeface="Times New Roman" panose="02020603050405020304" pitchFamily="18" charset="0"/>
+              </a:rPr>
+              <a:t>-     Differences in price compatibility and amenity overlap explain ranking differences.</a:t>
+            </a:r>
+          </a:p>
+          <a:p>
+            <a:pPr marL="0" indent="0">
+              <a:buNone/>
+            </a:pPr>
+            <a:r>
+              <a:rPr lang="en-IN" sz="1600" b="1" dirty="0">
+                <a:latin typeface="Times New Roman" panose="02020603050405020304" pitchFamily="18" charset="0"/>
+                <a:cs typeface="Times New Roman" panose="02020603050405020304" pitchFamily="18" charset="0"/>
+              </a:rPr>
+              <a:t>3.  Text similarity is stable</a:t>
+            </a:r>
+          </a:p>
+          <a:p>
+            <a:pPr marL="0" indent="0">
+              <a:buNone/>
+            </a:pPr>
+            <a:r>
+              <a:rPr lang="en-IN" sz="1200" dirty="0">
+                <a:latin typeface="Times New Roman" panose="02020603050405020304" pitchFamily="18" charset="0"/>
+                <a:cs typeface="Times New Roman" panose="02020603050405020304" pitchFamily="18" charset="0"/>
+              </a:rPr>
+              <a:t>-     Semantic intent is aligned across top options, acting as a baseline.</a:t>
+            </a:r>
+          </a:p>
+        </p:txBody>
+      </p:sp>
+    </p:spTree>
+    <p:extLst>
+      <p:ext uri="{BB962C8B-B14F-4D97-AF65-F5344CB8AC3E}">
+        <p14:creationId xmlns:p14="http://schemas.microsoft.com/office/powerpoint/2010/main" val="3512410628"/>
+      </p:ext>
+    </p:extLst>
+  </p:cSld>
+  <p:clrMapOvr>
+    <a:masterClrMapping/>
+  </p:clrMapOvr>
+</p:sld>
+</file>
+
+<file path=ppt/slides/slide8.xml><?xml version="1.0" encoding="utf-8"?>
+<p:sld xmlns:a="http://schemas.openxmlformats.org/drawingml/2006/main" xmlns:r="http://schemas.openxmlformats.org/officeDocument/2006/relationships" xmlns:p="http://schemas.openxmlformats.org/presentationml/2006/main">
+  <p:cSld>
+    <p:spTree>
+      <p:nvGrpSpPr>
+        <p:cNvPr id="1" name="">
+          <a:extLst>
+            <a:ext uri="{FF2B5EF4-FFF2-40B4-BE49-F238E27FC236}">
+              <a16:creationId xmlns:a16="http://schemas.microsoft.com/office/drawing/2014/main" id="{5424059A-97A5-A530-5315-5F7DD4A44D64}"/>
+            </a:ext>
+          </a:extLst>
+        </p:cNvPr>
+        <p:cNvGrpSpPr/>
+        <p:nvPr/>
+      </p:nvGrpSpPr>
+      <p:grpSpPr>
+        <a:xfrm>
+          <a:off x="0" y="0"/>
+          <a:ext cx="0" cy="0"/>
+          <a:chOff x="0" y="0"/>
+          <a:chExt cx="0" cy="0"/>
+        </a:xfrm>
+      </p:grpSpPr>
+      <p:sp>
+        <p:nvSpPr>
+          <p:cNvPr id="2" name="Title 1">
+            <a:extLst>
+              <a:ext uri="{FF2B5EF4-FFF2-40B4-BE49-F238E27FC236}">
+                <a16:creationId xmlns:a16="http://schemas.microsoft.com/office/drawing/2014/main" id="{47E6F224-5E6B-12CF-55B9-75DA6980B271}"/>
+              </a:ext>
+            </a:extLst>
+          </p:cNvPr>
+          <p:cNvSpPr>
+            <a:spLocks noGrp="1"/>
+          </p:cNvSpPr>
+          <p:nvPr>
+            <p:ph type="title"/>
+          </p:nvPr>
+        </p:nvSpPr>
+        <p:spPr/>
+        <p:txBody>
+          <a:bodyPr/>
+          <a:lstStyle/>
+          <a:p>
+            <a:r>
+              <a:rPr lang="en-IN" dirty="0">
+                <a:latin typeface="Times New Roman" panose="02020603050405020304" pitchFamily="18" charset="0"/>
+                <a:cs typeface="Times New Roman" panose="02020603050405020304" pitchFamily="18" charset="0"/>
+              </a:rPr>
+              <a:t>Example Recommendation &amp; </a:t>
+            </a:r>
+            <a:r>
+              <a:rPr lang="en-IN" dirty="0" err="1">
+                <a:latin typeface="Times New Roman" panose="02020603050405020304" pitchFamily="18" charset="0"/>
+                <a:cs typeface="Times New Roman" panose="02020603050405020304" pitchFamily="18" charset="0"/>
+              </a:rPr>
+              <a:t>Explainability</a:t>
+            </a:r>
+            <a:endParaRPr lang="en-US" dirty="0">
+              <a:latin typeface="Times New Roman" panose="02020603050405020304" pitchFamily="18" charset="0"/>
+              <a:cs typeface="Times New Roman" panose="02020603050405020304" pitchFamily="18" charset="0"/>
+            </a:endParaRPr>
+          </a:p>
+        </p:txBody>
+      </p:sp>
+      <p:sp>
+        <p:nvSpPr>
+          <p:cNvPr id="3" name="Content Placeholder 2">
+            <a:extLst>
+              <a:ext uri="{FF2B5EF4-FFF2-40B4-BE49-F238E27FC236}">
+                <a16:creationId xmlns:a16="http://schemas.microsoft.com/office/drawing/2014/main" id="{065E30D6-DDB0-B503-A86E-C05BFF9B5E83}"/>
+              </a:ext>
+            </a:extLst>
+          </p:cNvPr>
+          <p:cNvSpPr>
+            <a:spLocks noGrp="1"/>
+          </p:cNvSpPr>
+          <p:nvPr>
+            <p:ph idx="1"/>
+          </p:nvPr>
+        </p:nvSpPr>
+        <p:spPr>
+          <a:xfrm>
+            <a:off x="946150" y="4212336"/>
+            <a:ext cx="10185668" cy="1024128"/>
+          </a:xfrm>
+        </p:spPr>
+        <p:txBody>
+          <a:bodyPr>
+            <a:noAutofit/>
+          </a:bodyPr>
+          <a:lstStyle/>
+          <a:p>
+            <a:r>
+              <a:rPr lang="en-IN" sz="1800" dirty="0">
+                <a:latin typeface="Times New Roman" panose="02020603050405020304" pitchFamily="18" charset="0"/>
+                <a:cs typeface="Times New Roman" panose="02020603050405020304" pitchFamily="18" charset="0"/>
+              </a:rPr>
+              <a:t>This table shows the top recommendations along with the feature-level signals that explain why each property ranked where it did.</a:t>
+            </a:r>
+          </a:p>
+        </p:txBody>
+      </p:sp>
+      <p:graphicFrame>
+        <p:nvGraphicFramePr>
+          <p:cNvPr id="7" name="Table 6">
+            <a:extLst>
+              <a:ext uri="{FF2B5EF4-FFF2-40B4-BE49-F238E27FC236}">
+                <a16:creationId xmlns:a16="http://schemas.microsoft.com/office/drawing/2014/main" id="{BD66D542-DBAE-7FA0-85DF-1AD6039D5BAC}"/>
+              </a:ext>
+            </a:extLst>
+          </p:cNvPr>
+          <p:cNvGraphicFramePr>
+            <a:graphicFrameLocks noGrp="1"/>
+          </p:cNvGraphicFramePr>
+          <p:nvPr>
+            <p:extLst>
+              <p:ext uri="{D42A27DB-BD31-4B8C-83A1-F6EECF244321}">
+                <p14:modId xmlns:p14="http://schemas.microsoft.com/office/powerpoint/2010/main" val="2685575493"/>
+              </p:ext>
+            </p:extLst>
+          </p:nvPr>
+        </p:nvGraphicFramePr>
+        <p:xfrm>
+          <a:off x="946150" y="1864646"/>
+          <a:ext cx="10185669" cy="1744186"/>
+        </p:xfrm>
+        <a:graphic>
+          <a:graphicData uri="http://schemas.openxmlformats.org/drawingml/2006/table">
+            <a:tbl>
+              <a:tblPr/>
+              <a:tblGrid>
+                <a:gridCol w="1099171">
+                  <a:extLst>
+                    <a:ext uri="{9D8B030D-6E8A-4147-A177-3AD203B41FA5}">
+                      <a16:colId xmlns:a16="http://schemas.microsoft.com/office/drawing/2014/main" val="3209232855"/>
+                    </a:ext>
+                  </a:extLst>
+                </a:gridCol>
+                <a:gridCol w="1392301">
+                  <a:extLst>
+                    <a:ext uri="{9D8B030D-6E8A-4147-A177-3AD203B41FA5}">
+                      <a16:colId xmlns:a16="http://schemas.microsoft.com/office/drawing/2014/main" val="1144149492"/>
+                    </a:ext>
+                  </a:extLst>
+                </a:gridCol>
+                <a:gridCol w="1099171">
+                  <a:extLst>
+                    <a:ext uri="{9D8B030D-6E8A-4147-A177-3AD203B41FA5}">
+                      <a16:colId xmlns:a16="http://schemas.microsoft.com/office/drawing/2014/main" val="1828929411"/>
+                    </a:ext>
+                  </a:extLst>
+                </a:gridCol>
+                <a:gridCol w="1099171">
+                  <a:extLst>
+                    <a:ext uri="{9D8B030D-6E8A-4147-A177-3AD203B41FA5}">
+                      <a16:colId xmlns:a16="http://schemas.microsoft.com/office/drawing/2014/main" val="2906873505"/>
+                    </a:ext>
+                  </a:extLst>
+                </a:gridCol>
+                <a:gridCol w="1099171">
+                  <a:extLst>
+                    <a:ext uri="{9D8B030D-6E8A-4147-A177-3AD203B41FA5}">
+                      <a16:colId xmlns:a16="http://schemas.microsoft.com/office/drawing/2014/main" val="3347447122"/>
+                    </a:ext>
+                  </a:extLst>
+                </a:gridCol>
+                <a:gridCol w="1099171">
+                  <a:extLst>
+                    <a:ext uri="{9D8B030D-6E8A-4147-A177-3AD203B41FA5}">
+                      <a16:colId xmlns:a16="http://schemas.microsoft.com/office/drawing/2014/main" val="915763579"/>
+                    </a:ext>
+                  </a:extLst>
+                </a:gridCol>
+                <a:gridCol w="1346270">
+                  <a:extLst>
+                    <a:ext uri="{9D8B030D-6E8A-4147-A177-3AD203B41FA5}">
+                      <a16:colId xmlns:a16="http://schemas.microsoft.com/office/drawing/2014/main" val="86226126"/>
+                    </a:ext>
+                  </a:extLst>
+                </a:gridCol>
+                <a:gridCol w="1146048">
+                  <a:extLst>
+                    <a:ext uri="{9D8B030D-6E8A-4147-A177-3AD203B41FA5}">
+                      <a16:colId xmlns:a16="http://schemas.microsoft.com/office/drawing/2014/main" val="658072147"/>
+                    </a:ext>
+                  </a:extLst>
+                </a:gridCol>
+                <a:gridCol w="805195">
+                  <a:extLst>
+                    <a:ext uri="{9D8B030D-6E8A-4147-A177-3AD203B41FA5}">
+                      <a16:colId xmlns:a16="http://schemas.microsoft.com/office/drawing/2014/main" val="3564761835"/>
+                    </a:ext>
+                  </a:extLst>
+                </a:gridCol>
+              </a:tblGrid>
+              <a:tr h="642595">
+                <a:tc>
+                  <a:txBody>
+                    <a:bodyPr/>
+                    <a:lstStyle/>
+                    <a:p>
+                      <a:r>
+                        <a:rPr lang="en-IN"/>
+                        <a:t>Property</a:t>
+                      </a:r>
+                    </a:p>
+                  </a:txBody>
+                  <a:tcPr anchor="ctr">
+                    <a:lnL w="12700" cap="flat" cmpd="sng" algn="ctr">
+                      <a:solidFill>
+                        <a:schemeClr val="tx1"/>
+                      </a:solidFill>
+                      <a:prstDash val="solid"/>
+                      <a:round/>
+                      <a:headEnd type="none" w="med" len="med"/>
+                      <a:tailEnd type="none" w="med" len="med"/>
+                    </a:lnL>
+                    <a:lnR w="12700" cap="flat" cmpd="sng" algn="ctr">
+                      <a:solidFill>
+                        <a:schemeClr val="tx1"/>
+                      </a:solidFill>
+                      <a:prstDash val="solid"/>
+                      <a:round/>
+                      <a:headEnd type="none" w="med" len="med"/>
+                      <a:tailEnd type="none" w="med" len="med"/>
+                    </a:lnR>
+                    <a:lnT w="12700" cap="flat" cmpd="sng" algn="ctr">
+                      <a:solidFill>
+                        <a:schemeClr val="tx1"/>
+                      </a:solidFill>
+                      <a:prstDash val="solid"/>
+                      <a:round/>
+                      <a:headEnd type="none" w="med" len="med"/>
+                      <a:tailEnd type="none" w="med" len="med"/>
+                    </a:lnT>
+                    <a:lnB w="12700" cap="flat" cmpd="sng" algn="ctr">
+                      <a:solidFill>
+                        <a:schemeClr val="tx1"/>
+                      </a:solidFill>
+                      <a:prstDash val="solid"/>
+                      <a:round/>
+                      <a:headEnd type="none" w="med" len="med"/>
+                      <a:tailEnd type="none" w="med" len="med"/>
+                    </a:lnB>
+                    <a:noFill/>
+                  </a:tcPr>
+                </a:tc>
+                <a:tc>
+                  <a:txBody>
+                    <a:bodyPr/>
+                    <a:lstStyle/>
+                    <a:p>
+                      <a:r>
+                        <a:rPr lang="en-IN"/>
+                        <a:t>Match Score</a:t>
+                      </a:r>
+                    </a:p>
+                  </a:txBody>
+                  <a:tcPr anchor="ctr">
+                    <a:lnL w="12700" cap="flat" cmpd="sng" algn="ctr">
+                      <a:solidFill>
+                        <a:schemeClr val="tx1"/>
+                      </a:solidFill>
+                      <a:prstDash val="solid"/>
+                      <a:round/>
+                      <a:headEnd type="none" w="med" len="med"/>
+                      <a:tailEnd type="none" w="med" len="med"/>
+                    </a:lnL>
+                    <a:lnR w="12700" cap="flat" cmpd="sng" algn="ctr">
+                      <a:solidFill>
+                        <a:schemeClr val="tx1"/>
+                      </a:solidFill>
+                      <a:prstDash val="solid"/>
+                      <a:round/>
+                      <a:headEnd type="none" w="med" len="med"/>
+                      <a:tailEnd type="none" w="med" len="med"/>
+                    </a:lnR>
+                    <a:lnT w="12700" cap="flat" cmpd="sng" algn="ctr">
+                      <a:solidFill>
+                        <a:schemeClr val="tx1"/>
+                      </a:solidFill>
+                      <a:prstDash val="solid"/>
+                      <a:round/>
+                      <a:headEnd type="none" w="med" len="med"/>
+                      <a:tailEnd type="none" w="med" len="med"/>
+                    </a:lnT>
+                    <a:lnB w="12700" cap="flat" cmpd="sng" algn="ctr">
+                      <a:solidFill>
+                        <a:schemeClr val="tx1"/>
+                      </a:solidFill>
+                      <a:prstDash val="solid"/>
+                      <a:round/>
+                      <a:headEnd type="none" w="med" len="med"/>
+                      <a:tailEnd type="none" w="med" len="med"/>
+                    </a:lnB>
+                    <a:noFill/>
+                  </a:tcPr>
+                </a:tc>
+                <a:tc>
+                  <a:txBody>
+                    <a:bodyPr/>
+                    <a:lstStyle/>
+                    <a:p>
+                      <a:r>
+                        <a:rPr lang="en-IN"/>
+                        <a:t>Price</a:t>
+                      </a:r>
+                    </a:p>
+                  </a:txBody>
+                  <a:tcPr anchor="ctr">
+                    <a:lnL w="12700" cap="flat" cmpd="sng" algn="ctr">
+                      <a:solidFill>
+                        <a:schemeClr val="tx1"/>
+                      </a:solidFill>
+                      <a:prstDash val="solid"/>
+                      <a:round/>
+                      <a:headEnd type="none" w="med" len="med"/>
+                      <a:tailEnd type="none" w="med" len="med"/>
+                    </a:lnL>
+                    <a:lnR w="12700" cap="flat" cmpd="sng" algn="ctr">
+                      <a:solidFill>
+                        <a:schemeClr val="tx1"/>
+                      </a:solidFill>
+                      <a:prstDash val="solid"/>
+                      <a:round/>
+                      <a:headEnd type="none" w="med" len="med"/>
+                      <a:tailEnd type="none" w="med" len="med"/>
+                    </a:lnR>
+                    <a:lnT w="12700" cap="flat" cmpd="sng" algn="ctr">
+                      <a:solidFill>
+                        <a:schemeClr val="tx1"/>
+                      </a:solidFill>
+                      <a:prstDash val="solid"/>
+                      <a:round/>
+                      <a:headEnd type="none" w="med" len="med"/>
+                      <a:tailEnd type="none" w="med" len="med"/>
+                    </a:lnT>
+                    <a:lnB w="12700" cap="flat" cmpd="sng" algn="ctr">
+                      <a:solidFill>
+                        <a:schemeClr val="tx1"/>
+                      </a:solidFill>
+                      <a:prstDash val="solid"/>
+                      <a:round/>
+                      <a:headEnd type="none" w="med" len="med"/>
+                      <a:tailEnd type="none" w="med" len="med"/>
+                    </a:lnB>
+                    <a:noFill/>
+                  </a:tcPr>
+                </a:tc>
+                <a:tc>
+                  <a:txBody>
+                    <a:bodyPr/>
+                    <a:lstStyle/>
+                    <a:p>
+                      <a:r>
+                        <a:rPr lang="en-IN"/>
+                        <a:t>Bedrooms</a:t>
+                      </a:r>
+                    </a:p>
+                  </a:txBody>
+                  <a:tcPr anchor="ctr">
+                    <a:lnL w="12700" cap="flat" cmpd="sng" algn="ctr">
+                      <a:solidFill>
+                        <a:schemeClr val="tx1"/>
+                      </a:solidFill>
+                      <a:prstDash val="solid"/>
+                      <a:round/>
+                      <a:headEnd type="none" w="med" len="med"/>
+                      <a:tailEnd type="none" w="med" len="med"/>
+                    </a:lnL>
+                    <a:lnR w="12700" cap="flat" cmpd="sng" algn="ctr">
+                      <a:solidFill>
+                        <a:schemeClr val="tx1"/>
+                      </a:solidFill>
+                      <a:prstDash val="solid"/>
+                      <a:round/>
+                      <a:headEnd type="none" w="med" len="med"/>
+                      <a:tailEnd type="none" w="med" len="med"/>
+                    </a:lnR>
+                    <a:lnT w="12700" cap="flat" cmpd="sng" algn="ctr">
+                      <a:solidFill>
+                        <a:schemeClr val="tx1"/>
+                      </a:solidFill>
+                      <a:prstDash val="solid"/>
+                      <a:round/>
+                      <a:headEnd type="none" w="med" len="med"/>
+                      <a:tailEnd type="none" w="med" len="med"/>
+                    </a:lnT>
+                    <a:lnB w="12700" cap="flat" cmpd="sng" algn="ctr">
+                      <a:solidFill>
+                        <a:schemeClr val="tx1"/>
+                      </a:solidFill>
+                      <a:prstDash val="solid"/>
+                      <a:round/>
+                      <a:headEnd type="none" w="med" len="med"/>
+                      <a:tailEnd type="none" w="med" len="med"/>
+                    </a:lnB>
+                    <a:noFill/>
+                  </a:tcPr>
+                </a:tc>
+                <a:tc>
+                  <a:txBody>
+                    <a:bodyPr/>
+                    <a:lstStyle/>
+                    <a:p>
+                      <a:r>
+                        <a:rPr lang="en-IN"/>
+                        <a:t>Area (sq ft)</a:t>
+                      </a:r>
+                    </a:p>
+                  </a:txBody>
+                  <a:tcPr anchor="ctr">
+                    <a:lnL w="12700" cap="flat" cmpd="sng" algn="ctr">
+                      <a:solidFill>
+                        <a:schemeClr val="tx1"/>
+                      </a:solidFill>
+                      <a:prstDash val="solid"/>
+                      <a:round/>
+                      <a:headEnd type="none" w="med" len="med"/>
+                      <a:tailEnd type="none" w="med" len="med"/>
+                    </a:lnL>
+                    <a:lnR w="12700" cap="flat" cmpd="sng" algn="ctr">
+                      <a:solidFill>
+                        <a:schemeClr val="tx1"/>
+                      </a:solidFill>
+                      <a:prstDash val="solid"/>
+                      <a:round/>
+                      <a:headEnd type="none" w="med" len="med"/>
+                      <a:tailEnd type="none" w="med" len="med"/>
+                    </a:lnR>
+                    <a:lnT w="12700" cap="flat" cmpd="sng" algn="ctr">
+                      <a:solidFill>
+                        <a:schemeClr val="tx1"/>
+                      </a:solidFill>
+                      <a:prstDash val="solid"/>
+                      <a:round/>
+                      <a:headEnd type="none" w="med" len="med"/>
+                      <a:tailEnd type="none" w="med" len="med"/>
+                    </a:lnT>
+                    <a:lnB w="12700" cap="flat" cmpd="sng" algn="ctr">
+                      <a:solidFill>
+                        <a:schemeClr val="tx1"/>
+                      </a:solidFill>
+                      <a:prstDash val="solid"/>
+                      <a:round/>
+                      <a:headEnd type="none" w="med" len="med"/>
+                      <a:tailEnd type="none" w="med" len="med"/>
+                    </a:lnB>
+                    <a:noFill/>
+                  </a:tcPr>
+                </a:tc>
+                <a:tc>
+                  <a:txBody>
+                    <a:bodyPr/>
+                    <a:lstStyle/>
+                    <a:p>
+                      <a:r>
+                        <a:rPr lang="en-IN"/>
+                        <a:t>Text</a:t>
+                      </a:r>
+                    </a:p>
+                  </a:txBody>
+                  <a:tcPr anchor="ctr">
+                    <a:lnL w="12700" cap="flat" cmpd="sng" algn="ctr">
+                      <a:solidFill>
+                        <a:schemeClr val="tx1"/>
+                      </a:solidFill>
+                      <a:prstDash val="solid"/>
+                      <a:round/>
+                      <a:headEnd type="none" w="med" len="med"/>
+                      <a:tailEnd type="none" w="med" len="med"/>
+                    </a:lnL>
+                    <a:lnR w="12700" cap="flat" cmpd="sng" algn="ctr">
+                      <a:solidFill>
+                        <a:schemeClr val="tx1"/>
+                      </a:solidFill>
+                      <a:prstDash val="solid"/>
+                      <a:round/>
+                      <a:headEnd type="none" w="med" len="med"/>
+                      <a:tailEnd type="none" w="med" len="med"/>
+                    </a:lnR>
+                    <a:lnT w="12700" cap="flat" cmpd="sng" algn="ctr">
+                      <a:solidFill>
+                        <a:schemeClr val="tx1"/>
+                      </a:solidFill>
+                      <a:prstDash val="solid"/>
+                      <a:round/>
+                      <a:headEnd type="none" w="med" len="med"/>
+                      <a:tailEnd type="none" w="med" len="med"/>
+                    </a:lnT>
+                    <a:lnB w="12700" cap="flat" cmpd="sng" algn="ctr">
+                      <a:solidFill>
+                        <a:schemeClr val="tx1"/>
+                      </a:solidFill>
+                      <a:prstDash val="solid"/>
+                      <a:round/>
+                      <a:headEnd type="none" w="med" len="med"/>
+                      <a:tailEnd type="none" w="med" len="med"/>
+                    </a:lnB>
+                    <a:noFill/>
+                  </a:tcPr>
+                </a:tc>
+                <a:tc>
+                  <a:txBody>
+                    <a:bodyPr/>
+                    <a:lstStyle/>
+                    <a:p>
+                      <a:r>
+                        <a:rPr lang="en-IN"/>
+                        <a:t>Amenities</a:t>
+                      </a:r>
+                    </a:p>
+                  </a:txBody>
+                  <a:tcPr anchor="ctr">
+                    <a:lnL w="12700" cap="flat" cmpd="sng" algn="ctr">
+                      <a:solidFill>
+                        <a:schemeClr val="tx1"/>
+                      </a:solidFill>
+                      <a:prstDash val="solid"/>
+                      <a:round/>
+                      <a:headEnd type="none" w="med" len="med"/>
+                      <a:tailEnd type="none" w="med" len="med"/>
+                    </a:lnL>
+                    <a:lnR w="12700" cap="flat" cmpd="sng" algn="ctr">
+                      <a:solidFill>
+                        <a:schemeClr val="tx1"/>
+                      </a:solidFill>
+                      <a:prstDash val="solid"/>
+                      <a:round/>
+                      <a:headEnd type="none" w="med" len="med"/>
+                      <a:tailEnd type="none" w="med" len="med"/>
+                    </a:lnR>
+                    <a:lnT w="12700" cap="flat" cmpd="sng" algn="ctr">
+                      <a:solidFill>
+                        <a:schemeClr val="tx1"/>
+                      </a:solidFill>
+                      <a:prstDash val="solid"/>
+                      <a:round/>
+                      <a:headEnd type="none" w="med" len="med"/>
+                      <a:tailEnd type="none" w="med" len="med"/>
+                    </a:lnT>
+                    <a:lnB w="12700" cap="flat" cmpd="sng" algn="ctr">
+                      <a:solidFill>
+                        <a:schemeClr val="tx1"/>
+                      </a:solidFill>
+                      <a:prstDash val="solid"/>
+                      <a:round/>
+                      <a:headEnd type="none" w="med" len="med"/>
+                      <a:tailEnd type="none" w="med" len="med"/>
+                    </a:lnB>
+                    <a:noFill/>
+                  </a:tcPr>
+                </a:tc>
+                <a:tc>
+                  <a:txBody>
+                    <a:bodyPr/>
+                    <a:lstStyle/>
+                    <a:p>
+                      <a:r>
+                        <a:rPr lang="en-IN"/>
+                        <a:t>Price Fit</a:t>
+                      </a:r>
+                    </a:p>
+                  </a:txBody>
+                  <a:tcPr anchor="ctr">
+                    <a:lnL w="12700" cap="flat" cmpd="sng" algn="ctr">
+                      <a:solidFill>
+                        <a:schemeClr val="tx1"/>
+                      </a:solidFill>
+                      <a:prstDash val="solid"/>
+                      <a:round/>
+                      <a:headEnd type="none" w="med" len="med"/>
+                      <a:tailEnd type="none" w="med" len="med"/>
+                    </a:lnL>
+                    <a:lnR w="12700" cap="flat" cmpd="sng" algn="ctr">
+                      <a:solidFill>
+                        <a:schemeClr val="tx1"/>
+                      </a:solidFill>
+                      <a:prstDash val="solid"/>
+                      <a:round/>
+                      <a:headEnd type="none" w="med" len="med"/>
+                      <a:tailEnd type="none" w="med" len="med"/>
+                    </a:lnR>
+                    <a:lnT w="12700" cap="flat" cmpd="sng" algn="ctr">
+                      <a:solidFill>
+                        <a:schemeClr val="tx1"/>
+                      </a:solidFill>
+                      <a:prstDash val="solid"/>
+                      <a:round/>
+                      <a:headEnd type="none" w="med" len="med"/>
+                      <a:tailEnd type="none" w="med" len="med"/>
+                    </a:lnT>
+                    <a:lnB w="12700" cap="flat" cmpd="sng" algn="ctr">
+                      <a:solidFill>
+                        <a:schemeClr val="tx1"/>
+                      </a:solidFill>
+                      <a:prstDash val="solid"/>
+                      <a:round/>
+                      <a:headEnd type="none" w="med" len="med"/>
+                      <a:tailEnd type="none" w="med" len="med"/>
+                    </a:lnB>
+                    <a:noFill/>
+                  </a:tcPr>
+                </a:tc>
+                <a:tc>
+                  <a:txBody>
+                    <a:bodyPr/>
+                    <a:lstStyle/>
+                    <a:p>
+                      <a:r>
+                        <a:rPr lang="en-IN"/>
+                        <a:t>Area Fit</a:t>
+                      </a:r>
+                    </a:p>
+                  </a:txBody>
+                  <a:tcPr anchor="ctr">
+                    <a:lnL w="12700" cap="flat" cmpd="sng" algn="ctr">
+                      <a:solidFill>
+                        <a:schemeClr val="tx1"/>
+                      </a:solidFill>
+                      <a:prstDash val="solid"/>
+                      <a:round/>
+                      <a:headEnd type="none" w="med" len="med"/>
+                      <a:tailEnd type="none" w="med" len="med"/>
+                    </a:lnL>
+                    <a:lnR w="12700" cap="flat" cmpd="sng" algn="ctr">
+                      <a:solidFill>
+                        <a:schemeClr val="tx1"/>
+                      </a:solidFill>
+                      <a:prstDash val="solid"/>
+                      <a:round/>
+                      <a:headEnd type="none" w="med" len="med"/>
+                      <a:tailEnd type="none" w="med" len="med"/>
+                    </a:lnR>
+                    <a:lnT w="12700" cap="flat" cmpd="sng" algn="ctr">
+                      <a:solidFill>
+                        <a:schemeClr val="tx1"/>
+                      </a:solidFill>
+                      <a:prstDash val="solid"/>
+                      <a:round/>
+                      <a:headEnd type="none" w="med" len="med"/>
+                      <a:tailEnd type="none" w="med" len="med"/>
+                    </a:lnT>
+                    <a:lnB w="12700" cap="flat" cmpd="sng" algn="ctr">
+                      <a:solidFill>
+                        <a:schemeClr val="tx1"/>
+                      </a:solidFill>
+                      <a:prstDash val="solid"/>
+                      <a:round/>
+                      <a:headEnd type="none" w="med" len="med"/>
+                      <a:tailEnd type="none" w="med" len="med"/>
+                    </a:lnB>
+                    <a:noFill/>
+                  </a:tcPr>
+                </a:tc>
+                <a:extLst>
+                  <a:ext uri="{0D108BD9-81ED-4DB2-BD59-A6C34878D82A}">
+                    <a16:rowId xmlns:a16="http://schemas.microsoft.com/office/drawing/2014/main" val="1695207100"/>
+                  </a:ext>
+                </a:extLst>
+              </a:tr>
+              <a:tr h="367197">
+                <a:tc>
+                  <a:txBody>
+                    <a:bodyPr/>
+                    <a:lstStyle/>
+                    <a:p>
+                      <a:r>
+                        <a:rPr lang="en-IN"/>
+                        <a:t>21</a:t>
+                      </a:r>
+                    </a:p>
+                  </a:txBody>
+                  <a:tcPr anchor="ctr">
+                    <a:lnL w="12700" cap="flat" cmpd="sng" algn="ctr">
+                      <a:solidFill>
+                        <a:schemeClr val="tx1"/>
+                      </a:solidFill>
+                      <a:prstDash val="solid"/>
+                      <a:round/>
+                      <a:headEnd type="none" w="med" len="med"/>
+                      <a:tailEnd type="none" w="med" len="med"/>
+                    </a:lnL>
+                    <a:lnR w="12700" cap="flat" cmpd="sng" algn="ctr">
+                      <a:solidFill>
+                        <a:schemeClr val="tx1"/>
+                      </a:solidFill>
+                      <a:prstDash val="solid"/>
+                      <a:round/>
+                      <a:headEnd type="none" w="med" len="med"/>
+                      <a:tailEnd type="none" w="med" len="med"/>
+                    </a:lnR>
+                    <a:lnT w="12700" cap="flat" cmpd="sng" algn="ctr">
+                      <a:solidFill>
+                        <a:schemeClr val="tx1"/>
+                      </a:solidFill>
+                      <a:prstDash val="solid"/>
+                      <a:round/>
+                      <a:headEnd type="none" w="med" len="med"/>
+                      <a:tailEnd type="none" w="med" len="med"/>
+                    </a:lnT>
+                    <a:lnB w="12700" cap="flat" cmpd="sng" algn="ctr">
+                      <a:solidFill>
+                        <a:schemeClr val="tx1"/>
+                      </a:solidFill>
+                      <a:prstDash val="solid"/>
+                      <a:round/>
+                      <a:headEnd type="none" w="med" len="med"/>
+                      <a:tailEnd type="none" w="med" len="med"/>
+                    </a:lnB>
+                    <a:noFill/>
+                  </a:tcPr>
+                </a:tc>
+                <a:tc>
+                  <a:txBody>
+                    <a:bodyPr/>
+                    <a:lstStyle/>
+                    <a:p>
+                      <a:r>
+                        <a:rPr lang="en-IN"/>
+                        <a:t>0.62</a:t>
+                      </a:r>
+                    </a:p>
+                  </a:txBody>
+                  <a:tcPr anchor="ctr">
+                    <a:lnL w="12700" cap="flat" cmpd="sng" algn="ctr">
+                      <a:solidFill>
+                        <a:schemeClr val="tx1"/>
+                      </a:solidFill>
+                      <a:prstDash val="solid"/>
+                      <a:round/>
+                      <a:headEnd type="none" w="med" len="med"/>
+                      <a:tailEnd type="none" w="med" len="med"/>
+                    </a:lnL>
+                    <a:lnR w="12700" cap="flat" cmpd="sng" algn="ctr">
+                      <a:solidFill>
+                        <a:schemeClr val="tx1"/>
+                      </a:solidFill>
+                      <a:prstDash val="solid"/>
+                      <a:round/>
+                      <a:headEnd type="none" w="med" len="med"/>
+                      <a:tailEnd type="none" w="med" len="med"/>
+                    </a:lnR>
+                    <a:lnT w="12700" cap="flat" cmpd="sng" algn="ctr">
+                      <a:solidFill>
+                        <a:schemeClr val="tx1"/>
+                      </a:solidFill>
+                      <a:prstDash val="solid"/>
+                      <a:round/>
+                      <a:headEnd type="none" w="med" len="med"/>
+                      <a:tailEnd type="none" w="med" len="med"/>
+                    </a:lnT>
+                    <a:lnB w="12700" cap="flat" cmpd="sng" algn="ctr">
+                      <a:solidFill>
+                        <a:schemeClr val="tx1"/>
+                      </a:solidFill>
+                      <a:prstDash val="solid"/>
+                      <a:round/>
+                      <a:headEnd type="none" w="med" len="med"/>
+                      <a:tailEnd type="none" w="med" len="med"/>
+                    </a:lnB>
+                    <a:noFill/>
+                  </a:tcPr>
+                </a:tc>
+                <a:tc>
+                  <a:txBody>
+                    <a:bodyPr/>
+                    <a:lstStyle/>
+                    <a:p>
+                      <a:r>
+                        <a:rPr lang="en-IN"/>
+                        <a:t>$400k</a:t>
+                      </a:r>
+                    </a:p>
+                  </a:txBody>
+                  <a:tcPr anchor="ctr">
+                    <a:lnL w="12700" cap="flat" cmpd="sng" algn="ctr">
+                      <a:solidFill>
+                        <a:schemeClr val="tx1"/>
+                      </a:solidFill>
+                      <a:prstDash val="solid"/>
+                      <a:round/>
+                      <a:headEnd type="none" w="med" len="med"/>
+                      <a:tailEnd type="none" w="med" len="med"/>
+                    </a:lnL>
+                    <a:lnR w="12700" cap="flat" cmpd="sng" algn="ctr">
+                      <a:solidFill>
+                        <a:schemeClr val="tx1"/>
+                      </a:solidFill>
+                      <a:prstDash val="solid"/>
+                      <a:round/>
+                      <a:headEnd type="none" w="med" len="med"/>
+                      <a:tailEnd type="none" w="med" len="med"/>
+                    </a:lnR>
+                    <a:lnT w="12700" cap="flat" cmpd="sng" algn="ctr">
+                      <a:solidFill>
+                        <a:schemeClr val="tx1"/>
+                      </a:solidFill>
+                      <a:prstDash val="solid"/>
+                      <a:round/>
+                      <a:headEnd type="none" w="med" len="med"/>
+                      <a:tailEnd type="none" w="med" len="med"/>
+                    </a:lnT>
+                    <a:lnB w="12700" cap="flat" cmpd="sng" algn="ctr">
+                      <a:solidFill>
+                        <a:schemeClr val="tx1"/>
+                      </a:solidFill>
+                      <a:prstDash val="solid"/>
+                      <a:round/>
+                      <a:headEnd type="none" w="med" len="med"/>
+                      <a:tailEnd type="none" w="med" len="med"/>
+                    </a:lnB>
+                    <a:noFill/>
+                  </a:tcPr>
+                </a:tc>
+                <a:tc>
+                  <a:txBody>
+                    <a:bodyPr/>
+                    <a:lstStyle/>
+                    <a:p>
+                      <a:r>
+                        <a:rPr lang="en-IN"/>
+                        <a:t>5</a:t>
+                      </a:r>
+                    </a:p>
+                  </a:txBody>
+                  <a:tcPr anchor="ctr">
+                    <a:lnL w="12700" cap="flat" cmpd="sng" algn="ctr">
+                      <a:solidFill>
+                        <a:schemeClr val="tx1"/>
+                      </a:solidFill>
+                      <a:prstDash val="solid"/>
+                      <a:round/>
+                      <a:headEnd type="none" w="med" len="med"/>
+                      <a:tailEnd type="none" w="med" len="med"/>
+                    </a:lnL>
+                    <a:lnR w="12700" cap="flat" cmpd="sng" algn="ctr">
+                      <a:solidFill>
+                        <a:schemeClr val="tx1"/>
+                      </a:solidFill>
+                      <a:prstDash val="solid"/>
+                      <a:round/>
+                      <a:headEnd type="none" w="med" len="med"/>
+                      <a:tailEnd type="none" w="med" len="med"/>
+                    </a:lnR>
+                    <a:lnT w="12700" cap="flat" cmpd="sng" algn="ctr">
+                      <a:solidFill>
+                        <a:schemeClr val="tx1"/>
+                      </a:solidFill>
+                      <a:prstDash val="solid"/>
+                      <a:round/>
+                      <a:headEnd type="none" w="med" len="med"/>
+                      <a:tailEnd type="none" w="med" len="med"/>
+                    </a:lnT>
+                    <a:lnB w="12700" cap="flat" cmpd="sng" algn="ctr">
+                      <a:solidFill>
+                        <a:schemeClr val="tx1"/>
+                      </a:solidFill>
+                      <a:prstDash val="solid"/>
+                      <a:round/>
+                      <a:headEnd type="none" w="med" len="med"/>
+                      <a:tailEnd type="none" w="med" len="med"/>
+                    </a:lnB>
+                    <a:noFill/>
+                  </a:tcPr>
+                </a:tc>
+                <a:tc>
+                  <a:txBody>
+                    <a:bodyPr/>
+                    <a:lstStyle/>
+                    <a:p>
+                      <a:r>
+                        <a:rPr lang="en-IN"/>
+                        <a:t>2227</a:t>
+                      </a:r>
+                    </a:p>
+                  </a:txBody>
+                  <a:tcPr anchor="ctr">
+                    <a:lnL w="12700" cap="flat" cmpd="sng" algn="ctr">
+                      <a:solidFill>
+                        <a:schemeClr val="tx1"/>
+                      </a:solidFill>
+                      <a:prstDash val="solid"/>
+                      <a:round/>
+                      <a:headEnd type="none" w="med" len="med"/>
+                      <a:tailEnd type="none" w="med" len="med"/>
+                    </a:lnL>
+                    <a:lnR w="12700" cap="flat" cmpd="sng" algn="ctr">
+                      <a:solidFill>
+                        <a:schemeClr val="tx1"/>
+                      </a:solidFill>
+                      <a:prstDash val="solid"/>
+                      <a:round/>
+                      <a:headEnd type="none" w="med" len="med"/>
+                      <a:tailEnd type="none" w="med" len="med"/>
+                    </a:lnR>
+                    <a:lnT w="12700" cap="flat" cmpd="sng" algn="ctr">
+                      <a:solidFill>
+                        <a:schemeClr val="tx1"/>
+                      </a:solidFill>
+                      <a:prstDash val="solid"/>
+                      <a:round/>
+                      <a:headEnd type="none" w="med" len="med"/>
+                      <a:tailEnd type="none" w="med" len="med"/>
+                    </a:lnT>
+                    <a:lnB w="12700" cap="flat" cmpd="sng" algn="ctr">
+                      <a:solidFill>
+                        <a:schemeClr val="tx1"/>
+                      </a:solidFill>
+                      <a:prstDash val="solid"/>
+                      <a:round/>
+                      <a:headEnd type="none" w="med" len="med"/>
+                      <a:tailEnd type="none" w="med" len="med"/>
+                    </a:lnB>
+                    <a:noFill/>
+                  </a:tcPr>
+                </a:tc>
+                <a:tc>
+                  <a:txBody>
+                    <a:bodyPr/>
+                    <a:lstStyle/>
+                    <a:p>
+                      <a:r>
+                        <a:rPr lang="en-IN"/>
+                        <a:t>0.58</a:t>
+                      </a:r>
+                    </a:p>
+                  </a:txBody>
+                  <a:tcPr anchor="ctr">
+                    <a:lnL w="12700" cap="flat" cmpd="sng" algn="ctr">
+                      <a:solidFill>
+                        <a:schemeClr val="tx1"/>
+                      </a:solidFill>
+                      <a:prstDash val="solid"/>
+                      <a:round/>
+                      <a:headEnd type="none" w="med" len="med"/>
+                      <a:tailEnd type="none" w="med" len="med"/>
+                    </a:lnL>
+                    <a:lnR w="12700" cap="flat" cmpd="sng" algn="ctr">
+                      <a:solidFill>
+                        <a:schemeClr val="tx1"/>
+                      </a:solidFill>
+                      <a:prstDash val="solid"/>
+                      <a:round/>
+                      <a:headEnd type="none" w="med" len="med"/>
+                      <a:tailEnd type="none" w="med" len="med"/>
+                    </a:lnR>
+                    <a:lnT w="12700" cap="flat" cmpd="sng" algn="ctr">
+                      <a:solidFill>
+                        <a:schemeClr val="tx1"/>
+                      </a:solidFill>
+                      <a:prstDash val="solid"/>
+                      <a:round/>
+                      <a:headEnd type="none" w="med" len="med"/>
+                      <a:tailEnd type="none" w="med" len="med"/>
+                    </a:lnT>
+                    <a:lnB w="12700" cap="flat" cmpd="sng" algn="ctr">
+                      <a:solidFill>
+                        <a:schemeClr val="tx1"/>
+                      </a:solidFill>
+                      <a:prstDash val="solid"/>
+                      <a:round/>
+                      <a:headEnd type="none" w="med" len="med"/>
+                      <a:tailEnd type="none" w="med" len="med"/>
+                    </a:lnB>
+                    <a:noFill/>
+                  </a:tcPr>
+                </a:tc>
+                <a:tc>
+                  <a:txBody>
+                    <a:bodyPr/>
+                    <a:lstStyle/>
+                    <a:p>
+                      <a:r>
+                        <a:rPr lang="en-IN"/>
+                        <a:t>0.50</a:t>
+                      </a:r>
+                    </a:p>
+                  </a:txBody>
+                  <a:tcPr anchor="ctr">
+                    <a:lnL w="12700" cap="flat" cmpd="sng" algn="ctr">
+                      <a:solidFill>
+                        <a:schemeClr val="tx1"/>
+                      </a:solidFill>
+                      <a:prstDash val="solid"/>
+                      <a:round/>
+                      <a:headEnd type="none" w="med" len="med"/>
+                      <a:tailEnd type="none" w="med" len="med"/>
+                    </a:lnL>
+                    <a:lnR w="12700" cap="flat" cmpd="sng" algn="ctr">
+                      <a:solidFill>
+                        <a:schemeClr val="tx1"/>
+                      </a:solidFill>
+                      <a:prstDash val="solid"/>
+                      <a:round/>
+                      <a:headEnd type="none" w="med" len="med"/>
+                      <a:tailEnd type="none" w="med" len="med"/>
+                    </a:lnR>
+                    <a:lnT w="12700" cap="flat" cmpd="sng" algn="ctr">
+                      <a:solidFill>
+                        <a:schemeClr val="tx1"/>
+                      </a:solidFill>
+                      <a:prstDash val="solid"/>
+                      <a:round/>
+                      <a:headEnd type="none" w="med" len="med"/>
+                      <a:tailEnd type="none" w="med" len="med"/>
+                    </a:lnT>
+                    <a:lnB w="12700" cap="flat" cmpd="sng" algn="ctr">
+                      <a:solidFill>
+                        <a:schemeClr val="tx1"/>
+                      </a:solidFill>
+                      <a:prstDash val="solid"/>
+                      <a:round/>
+                      <a:headEnd type="none" w="med" len="med"/>
+                      <a:tailEnd type="none" w="med" len="med"/>
+                    </a:lnB>
+                    <a:noFill/>
+                  </a:tcPr>
+                </a:tc>
+                <a:tc>
+                  <a:txBody>
+                    <a:bodyPr/>
+                    <a:lstStyle/>
+                    <a:p>
+                      <a:r>
+                        <a:rPr lang="en-IN"/>
+                        <a:t>0.92</a:t>
+                      </a:r>
+                    </a:p>
+                  </a:txBody>
+                  <a:tcPr anchor="ctr">
+                    <a:lnL w="12700" cap="flat" cmpd="sng" algn="ctr">
+                      <a:solidFill>
+                        <a:schemeClr val="tx1"/>
+                      </a:solidFill>
+                      <a:prstDash val="solid"/>
+                      <a:round/>
+                      <a:headEnd type="none" w="med" len="med"/>
+                      <a:tailEnd type="none" w="med" len="med"/>
+                    </a:lnL>
+                    <a:lnR w="12700" cap="flat" cmpd="sng" algn="ctr">
+                      <a:solidFill>
+                        <a:schemeClr val="tx1"/>
+                      </a:solidFill>
+                      <a:prstDash val="solid"/>
+                      <a:round/>
+                      <a:headEnd type="none" w="med" len="med"/>
+                      <a:tailEnd type="none" w="med" len="med"/>
+                    </a:lnR>
+                    <a:lnT w="12700" cap="flat" cmpd="sng" algn="ctr">
+                      <a:solidFill>
+                        <a:schemeClr val="tx1"/>
+                      </a:solidFill>
+                      <a:prstDash val="solid"/>
+                      <a:round/>
+                      <a:headEnd type="none" w="med" len="med"/>
+                      <a:tailEnd type="none" w="med" len="med"/>
+                    </a:lnT>
+                    <a:lnB w="12700" cap="flat" cmpd="sng" algn="ctr">
+                      <a:solidFill>
+                        <a:schemeClr val="tx1"/>
+                      </a:solidFill>
+                      <a:prstDash val="solid"/>
+                      <a:round/>
+                      <a:headEnd type="none" w="med" len="med"/>
+                      <a:tailEnd type="none" w="med" len="med"/>
+                    </a:lnB>
+                    <a:noFill/>
+                  </a:tcPr>
+                </a:tc>
+                <a:tc>
+                  <a:txBody>
+                    <a:bodyPr/>
+                    <a:lstStyle/>
+                    <a:p>
+                      <a:r>
+                        <a:rPr lang="en-IN"/>
+                        <a:t>1.00</a:t>
+                      </a:r>
+                    </a:p>
+                  </a:txBody>
+                  <a:tcPr anchor="ctr">
+                    <a:lnL w="12700" cap="flat" cmpd="sng" algn="ctr">
+                      <a:solidFill>
+                        <a:schemeClr val="tx1"/>
+                      </a:solidFill>
+                      <a:prstDash val="solid"/>
+                      <a:round/>
+                      <a:headEnd type="none" w="med" len="med"/>
+                      <a:tailEnd type="none" w="med" len="med"/>
+                    </a:lnL>
+                    <a:lnR w="12700" cap="flat" cmpd="sng" algn="ctr">
+                      <a:solidFill>
+                        <a:schemeClr val="tx1"/>
+                      </a:solidFill>
+                      <a:prstDash val="solid"/>
+                      <a:round/>
+                      <a:headEnd type="none" w="med" len="med"/>
+                      <a:tailEnd type="none" w="med" len="med"/>
+                    </a:lnR>
+                    <a:lnT w="12700" cap="flat" cmpd="sng" algn="ctr">
+                      <a:solidFill>
+                        <a:schemeClr val="tx1"/>
+                      </a:solidFill>
+                      <a:prstDash val="solid"/>
+                      <a:round/>
+                      <a:headEnd type="none" w="med" len="med"/>
+                      <a:tailEnd type="none" w="med" len="med"/>
+                    </a:lnT>
+                    <a:lnB w="12700" cap="flat" cmpd="sng" algn="ctr">
+                      <a:solidFill>
+                        <a:schemeClr val="tx1"/>
+                      </a:solidFill>
+                      <a:prstDash val="solid"/>
+                      <a:round/>
+                      <a:headEnd type="none" w="med" len="med"/>
+                      <a:tailEnd type="none" w="med" len="med"/>
+                    </a:lnB>
+                    <a:noFill/>
+                  </a:tcPr>
+                </a:tc>
+                <a:extLst>
+                  <a:ext uri="{0D108BD9-81ED-4DB2-BD59-A6C34878D82A}">
+                    <a16:rowId xmlns:a16="http://schemas.microsoft.com/office/drawing/2014/main" val="3442240425"/>
+                  </a:ext>
+                </a:extLst>
+              </a:tr>
+              <a:tr h="367197">
+                <a:tc>
+                  <a:txBody>
+                    <a:bodyPr/>
+                    <a:lstStyle/>
+                    <a:p>
+                      <a:r>
+                        <a:rPr lang="en-IN"/>
+                        <a:t>13</a:t>
+                      </a:r>
+                    </a:p>
+                  </a:txBody>
+                  <a:tcPr anchor="ctr">
+                    <a:lnL w="12700" cap="flat" cmpd="sng" algn="ctr">
+                      <a:solidFill>
+                        <a:schemeClr val="tx1"/>
+                      </a:solidFill>
+                      <a:prstDash val="solid"/>
+                      <a:round/>
+                      <a:headEnd type="none" w="med" len="med"/>
+                      <a:tailEnd type="none" w="med" len="med"/>
+                    </a:lnL>
+                    <a:lnR w="12700" cap="flat" cmpd="sng" algn="ctr">
+                      <a:solidFill>
+                        <a:schemeClr val="tx1"/>
+                      </a:solidFill>
+                      <a:prstDash val="solid"/>
+                      <a:round/>
+                      <a:headEnd type="none" w="med" len="med"/>
+                      <a:tailEnd type="none" w="med" len="med"/>
+                    </a:lnR>
+                    <a:lnT w="12700" cap="flat" cmpd="sng" algn="ctr">
+                      <a:solidFill>
+                        <a:schemeClr val="tx1"/>
+                      </a:solidFill>
+                      <a:prstDash val="solid"/>
+                      <a:round/>
+                      <a:headEnd type="none" w="med" len="med"/>
+                      <a:tailEnd type="none" w="med" len="med"/>
+                    </a:lnT>
+                    <a:lnB w="12700" cap="flat" cmpd="sng" algn="ctr">
+                      <a:solidFill>
+                        <a:schemeClr val="tx1"/>
+                      </a:solidFill>
+                      <a:prstDash val="solid"/>
+                      <a:round/>
+                      <a:headEnd type="none" w="med" len="med"/>
+                      <a:tailEnd type="none" w="med" len="med"/>
+                    </a:lnB>
+                    <a:noFill/>
+                  </a:tcPr>
+                </a:tc>
+                <a:tc>
+                  <a:txBody>
+                    <a:bodyPr/>
+                    <a:lstStyle/>
+                    <a:p>
+                      <a:r>
+                        <a:rPr lang="en-IN"/>
+                        <a:t>0.53</a:t>
+                      </a:r>
+                    </a:p>
+                  </a:txBody>
+                  <a:tcPr anchor="ctr">
+                    <a:lnL w="12700" cap="flat" cmpd="sng" algn="ctr">
+                      <a:solidFill>
+                        <a:schemeClr val="tx1"/>
+                      </a:solidFill>
+                      <a:prstDash val="solid"/>
+                      <a:round/>
+                      <a:headEnd type="none" w="med" len="med"/>
+                      <a:tailEnd type="none" w="med" len="med"/>
+                    </a:lnL>
+                    <a:lnR w="12700" cap="flat" cmpd="sng" algn="ctr">
+                      <a:solidFill>
+                        <a:schemeClr val="tx1"/>
+                      </a:solidFill>
+                      <a:prstDash val="solid"/>
+                      <a:round/>
+                      <a:headEnd type="none" w="med" len="med"/>
+                      <a:tailEnd type="none" w="med" len="med"/>
+                    </a:lnR>
+                    <a:lnT w="12700" cap="flat" cmpd="sng" algn="ctr">
+                      <a:solidFill>
+                        <a:schemeClr val="tx1"/>
+                      </a:solidFill>
+                      <a:prstDash val="solid"/>
+                      <a:round/>
+                      <a:headEnd type="none" w="med" len="med"/>
+                      <a:tailEnd type="none" w="med" len="med"/>
+                    </a:lnT>
+                    <a:lnB w="12700" cap="flat" cmpd="sng" algn="ctr">
+                      <a:solidFill>
+                        <a:schemeClr val="tx1"/>
+                      </a:solidFill>
+                      <a:prstDash val="solid"/>
+                      <a:round/>
+                      <a:headEnd type="none" w="med" len="med"/>
+                      <a:tailEnd type="none" w="med" len="med"/>
+                    </a:lnB>
+                    <a:noFill/>
+                  </a:tcPr>
+                </a:tc>
+                <a:tc>
+                  <a:txBody>
+                    <a:bodyPr/>
+                    <a:lstStyle/>
+                    <a:p>
+                      <a:r>
+                        <a:rPr lang="en-IN"/>
+                        <a:t>$500k</a:t>
+                      </a:r>
+                    </a:p>
+                  </a:txBody>
+                  <a:tcPr anchor="ctr">
+                    <a:lnL w="12700" cap="flat" cmpd="sng" algn="ctr">
+                      <a:solidFill>
+                        <a:schemeClr val="tx1"/>
+                      </a:solidFill>
+                      <a:prstDash val="solid"/>
+                      <a:round/>
+                      <a:headEnd type="none" w="med" len="med"/>
+                      <a:tailEnd type="none" w="med" len="med"/>
+                    </a:lnL>
+                    <a:lnR w="12700" cap="flat" cmpd="sng" algn="ctr">
+                      <a:solidFill>
+                        <a:schemeClr val="tx1"/>
+                      </a:solidFill>
+                      <a:prstDash val="solid"/>
+                      <a:round/>
+                      <a:headEnd type="none" w="med" len="med"/>
+                      <a:tailEnd type="none" w="med" len="med"/>
+                    </a:lnR>
+                    <a:lnT w="12700" cap="flat" cmpd="sng" algn="ctr">
+                      <a:solidFill>
+                        <a:schemeClr val="tx1"/>
+                      </a:solidFill>
+                      <a:prstDash val="solid"/>
+                      <a:round/>
+                      <a:headEnd type="none" w="med" len="med"/>
+                      <a:tailEnd type="none" w="med" len="med"/>
+                    </a:lnT>
+                    <a:lnB w="12700" cap="flat" cmpd="sng" algn="ctr">
+                      <a:solidFill>
+                        <a:schemeClr val="tx1"/>
+                      </a:solidFill>
+                      <a:prstDash val="solid"/>
+                      <a:round/>
+                      <a:headEnd type="none" w="med" len="med"/>
+                      <a:tailEnd type="none" w="med" len="med"/>
+                    </a:lnB>
+                    <a:noFill/>
+                  </a:tcPr>
+                </a:tc>
+                <a:tc>
+                  <a:txBody>
+                    <a:bodyPr/>
+                    <a:lstStyle/>
+                    <a:p>
+                      <a:r>
+                        <a:rPr lang="en-IN"/>
+                        <a:t>3</a:t>
+                      </a:r>
+                    </a:p>
+                  </a:txBody>
+                  <a:tcPr anchor="ctr">
+                    <a:lnL w="12700" cap="flat" cmpd="sng" algn="ctr">
+                      <a:solidFill>
+                        <a:schemeClr val="tx1"/>
+                      </a:solidFill>
+                      <a:prstDash val="solid"/>
+                      <a:round/>
+                      <a:headEnd type="none" w="med" len="med"/>
+                      <a:tailEnd type="none" w="med" len="med"/>
+                    </a:lnL>
+                    <a:lnR w="12700" cap="flat" cmpd="sng" algn="ctr">
+                      <a:solidFill>
+                        <a:schemeClr val="tx1"/>
+                      </a:solidFill>
+                      <a:prstDash val="solid"/>
+                      <a:round/>
+                      <a:headEnd type="none" w="med" len="med"/>
+                      <a:tailEnd type="none" w="med" len="med"/>
+                    </a:lnR>
+                    <a:lnT w="12700" cap="flat" cmpd="sng" algn="ctr">
+                      <a:solidFill>
+                        <a:schemeClr val="tx1"/>
+                      </a:solidFill>
+                      <a:prstDash val="solid"/>
+                      <a:round/>
+                      <a:headEnd type="none" w="med" len="med"/>
+                      <a:tailEnd type="none" w="med" len="med"/>
+                    </a:lnT>
+                    <a:lnB w="12700" cap="flat" cmpd="sng" algn="ctr">
+                      <a:solidFill>
+                        <a:schemeClr val="tx1"/>
+                      </a:solidFill>
+                      <a:prstDash val="solid"/>
+                      <a:round/>
+                      <a:headEnd type="none" w="med" len="med"/>
+                      <a:tailEnd type="none" w="med" len="med"/>
+                    </a:lnB>
+                    <a:noFill/>
+                  </a:tcPr>
+                </a:tc>
+                <a:tc>
+                  <a:txBody>
+                    <a:bodyPr/>
+                    <a:lstStyle/>
+                    <a:p>
+                      <a:r>
+                        <a:rPr lang="en-IN"/>
+                        <a:t>1198</a:t>
+                      </a:r>
+                    </a:p>
+                  </a:txBody>
+                  <a:tcPr anchor="ctr">
+                    <a:lnL w="12700" cap="flat" cmpd="sng" algn="ctr">
+                      <a:solidFill>
+                        <a:schemeClr val="tx1"/>
+                      </a:solidFill>
+                      <a:prstDash val="solid"/>
+                      <a:round/>
+                      <a:headEnd type="none" w="med" len="med"/>
+                      <a:tailEnd type="none" w="med" len="med"/>
+                    </a:lnL>
+                    <a:lnR w="12700" cap="flat" cmpd="sng" algn="ctr">
+                      <a:solidFill>
+                        <a:schemeClr val="tx1"/>
+                      </a:solidFill>
+                      <a:prstDash val="solid"/>
+                      <a:round/>
+                      <a:headEnd type="none" w="med" len="med"/>
+                      <a:tailEnd type="none" w="med" len="med"/>
+                    </a:lnR>
+                    <a:lnT w="12700" cap="flat" cmpd="sng" algn="ctr">
+                      <a:solidFill>
+                        <a:schemeClr val="tx1"/>
+                      </a:solidFill>
+                      <a:prstDash val="solid"/>
+                      <a:round/>
+                      <a:headEnd type="none" w="med" len="med"/>
+                      <a:tailEnd type="none" w="med" len="med"/>
+                    </a:lnT>
+                    <a:lnB w="12700" cap="flat" cmpd="sng" algn="ctr">
+                      <a:solidFill>
+                        <a:schemeClr val="tx1"/>
+                      </a:solidFill>
+                      <a:prstDash val="solid"/>
+                      <a:round/>
+                      <a:headEnd type="none" w="med" len="med"/>
+                      <a:tailEnd type="none" w="med" len="med"/>
+                    </a:lnB>
+                    <a:noFill/>
+                  </a:tcPr>
+                </a:tc>
+                <a:tc>
+                  <a:txBody>
+                    <a:bodyPr/>
+                    <a:lstStyle/>
+                    <a:p>
+                      <a:r>
+                        <a:rPr lang="en-IN"/>
+                        <a:t>0.61</a:t>
+                      </a:r>
+                    </a:p>
+                  </a:txBody>
+                  <a:tcPr anchor="ctr">
+                    <a:lnL w="12700" cap="flat" cmpd="sng" algn="ctr">
+                      <a:solidFill>
+                        <a:schemeClr val="tx1"/>
+                      </a:solidFill>
+                      <a:prstDash val="solid"/>
+                      <a:round/>
+                      <a:headEnd type="none" w="med" len="med"/>
+                      <a:tailEnd type="none" w="med" len="med"/>
+                    </a:lnL>
+                    <a:lnR w="12700" cap="flat" cmpd="sng" algn="ctr">
+                      <a:solidFill>
+                        <a:schemeClr val="tx1"/>
+                      </a:solidFill>
+                      <a:prstDash val="solid"/>
+                      <a:round/>
+                      <a:headEnd type="none" w="med" len="med"/>
+                      <a:tailEnd type="none" w="med" len="med"/>
+                    </a:lnR>
+                    <a:lnT w="12700" cap="flat" cmpd="sng" algn="ctr">
+                      <a:solidFill>
+                        <a:schemeClr val="tx1"/>
+                      </a:solidFill>
+                      <a:prstDash val="solid"/>
+                      <a:round/>
+                      <a:headEnd type="none" w="med" len="med"/>
+                      <a:tailEnd type="none" w="med" len="med"/>
+                    </a:lnT>
+                    <a:lnB w="12700" cap="flat" cmpd="sng" algn="ctr">
+                      <a:solidFill>
+                        <a:schemeClr val="tx1"/>
+                      </a:solidFill>
+                      <a:prstDash val="solid"/>
+                      <a:round/>
+                      <a:headEnd type="none" w="med" len="med"/>
+                      <a:tailEnd type="none" w="med" len="med"/>
+                    </a:lnB>
+                    <a:noFill/>
+                  </a:tcPr>
+                </a:tc>
+                <a:tc>
+                  <a:txBody>
+                    <a:bodyPr/>
+                    <a:lstStyle/>
+                    <a:p>
+                      <a:r>
+                        <a:rPr lang="en-IN"/>
+                        <a:t>0.00</a:t>
+                      </a:r>
+                    </a:p>
+                  </a:txBody>
+                  <a:tcPr anchor="ctr">
+                    <a:lnL w="12700" cap="flat" cmpd="sng" algn="ctr">
+                      <a:solidFill>
+                        <a:schemeClr val="tx1"/>
+                      </a:solidFill>
+                      <a:prstDash val="solid"/>
+                      <a:round/>
+                      <a:headEnd type="none" w="med" len="med"/>
+                      <a:tailEnd type="none" w="med" len="med"/>
+                    </a:lnL>
+                    <a:lnR w="12700" cap="flat" cmpd="sng" algn="ctr">
+                      <a:solidFill>
+                        <a:schemeClr val="tx1"/>
+                      </a:solidFill>
+                      <a:prstDash val="solid"/>
+                      <a:round/>
+                      <a:headEnd type="none" w="med" len="med"/>
+                      <a:tailEnd type="none" w="med" len="med"/>
+                    </a:lnR>
+                    <a:lnT w="12700" cap="flat" cmpd="sng" algn="ctr">
+                      <a:solidFill>
+                        <a:schemeClr val="tx1"/>
+                      </a:solidFill>
+                      <a:prstDash val="solid"/>
+                      <a:round/>
+                      <a:headEnd type="none" w="med" len="med"/>
+                      <a:tailEnd type="none" w="med" len="med"/>
+                    </a:lnT>
+                    <a:lnB w="12700" cap="flat" cmpd="sng" algn="ctr">
+                      <a:solidFill>
+                        <a:schemeClr val="tx1"/>
+                      </a:solidFill>
+                      <a:prstDash val="solid"/>
+                      <a:round/>
+                      <a:headEnd type="none" w="med" len="med"/>
+                      <a:tailEnd type="none" w="med" len="med"/>
+                    </a:lnB>
+                    <a:noFill/>
+                  </a:tcPr>
+                </a:tc>
+                <a:tc>
+                  <a:txBody>
+                    <a:bodyPr/>
+                    <a:lstStyle/>
+                    <a:p>
+                      <a:r>
+                        <a:rPr lang="en-IN"/>
+                        <a:t>1.00</a:t>
+                      </a:r>
+                    </a:p>
+                  </a:txBody>
+                  <a:tcPr anchor="ctr">
+                    <a:lnL w="12700" cap="flat" cmpd="sng" algn="ctr">
+                      <a:solidFill>
+                        <a:schemeClr val="tx1"/>
+                      </a:solidFill>
+                      <a:prstDash val="solid"/>
+                      <a:round/>
+                      <a:headEnd type="none" w="med" len="med"/>
+                      <a:tailEnd type="none" w="med" len="med"/>
+                    </a:lnL>
+                    <a:lnR w="12700" cap="flat" cmpd="sng" algn="ctr">
+                      <a:solidFill>
+                        <a:schemeClr val="tx1"/>
+                      </a:solidFill>
+                      <a:prstDash val="solid"/>
+                      <a:round/>
+                      <a:headEnd type="none" w="med" len="med"/>
+                      <a:tailEnd type="none" w="med" len="med"/>
+                    </a:lnR>
+                    <a:lnT w="12700" cap="flat" cmpd="sng" algn="ctr">
+                      <a:solidFill>
+                        <a:schemeClr val="tx1"/>
+                      </a:solidFill>
+                      <a:prstDash val="solid"/>
+                      <a:round/>
+                      <a:headEnd type="none" w="med" len="med"/>
+                      <a:tailEnd type="none" w="med" len="med"/>
+                    </a:lnT>
+                    <a:lnB w="12700" cap="flat" cmpd="sng" algn="ctr">
+                      <a:solidFill>
+                        <a:schemeClr val="tx1"/>
+                      </a:solidFill>
+                      <a:prstDash val="solid"/>
+                      <a:round/>
+                      <a:headEnd type="none" w="med" len="med"/>
+                      <a:tailEnd type="none" w="med" len="med"/>
+                    </a:lnB>
+                    <a:noFill/>
+                  </a:tcPr>
+                </a:tc>
+                <a:tc>
+                  <a:txBody>
+                    <a:bodyPr/>
+                    <a:lstStyle/>
+                    <a:p>
+                      <a:r>
+                        <a:rPr lang="en-IN"/>
+                        <a:t>1.00</a:t>
+                      </a:r>
+                    </a:p>
+                  </a:txBody>
+                  <a:tcPr anchor="ctr">
+                    <a:lnL w="12700" cap="flat" cmpd="sng" algn="ctr">
+                      <a:solidFill>
+                        <a:schemeClr val="tx1"/>
+                      </a:solidFill>
+                      <a:prstDash val="solid"/>
+                      <a:round/>
+                      <a:headEnd type="none" w="med" len="med"/>
+                      <a:tailEnd type="none" w="med" len="med"/>
+                    </a:lnL>
+                    <a:lnR w="12700" cap="flat" cmpd="sng" algn="ctr">
+                      <a:solidFill>
+                        <a:schemeClr val="tx1"/>
+                      </a:solidFill>
+                      <a:prstDash val="solid"/>
+                      <a:round/>
+                      <a:headEnd type="none" w="med" len="med"/>
+                      <a:tailEnd type="none" w="med" len="med"/>
+                    </a:lnR>
+                    <a:lnT w="12700" cap="flat" cmpd="sng" algn="ctr">
+                      <a:solidFill>
+                        <a:schemeClr val="tx1"/>
+                      </a:solidFill>
+                      <a:prstDash val="solid"/>
+                      <a:round/>
+                      <a:headEnd type="none" w="med" len="med"/>
+                      <a:tailEnd type="none" w="med" len="med"/>
+                    </a:lnT>
+                    <a:lnB w="12700" cap="flat" cmpd="sng" algn="ctr">
+                      <a:solidFill>
+                        <a:schemeClr val="tx1"/>
+                      </a:solidFill>
+                      <a:prstDash val="solid"/>
+                      <a:round/>
+                      <a:headEnd type="none" w="med" len="med"/>
+                      <a:tailEnd type="none" w="med" len="med"/>
+                    </a:lnB>
+                    <a:noFill/>
+                  </a:tcPr>
+                </a:tc>
+                <a:extLst>
+                  <a:ext uri="{0D108BD9-81ED-4DB2-BD59-A6C34878D82A}">
+                    <a16:rowId xmlns:a16="http://schemas.microsoft.com/office/drawing/2014/main" val="1392889625"/>
+                  </a:ext>
+                </a:extLst>
+              </a:tr>
+              <a:tr h="367197">
+                <a:tc>
+                  <a:txBody>
+                    <a:bodyPr/>
+                    <a:lstStyle/>
+                    <a:p>
+                      <a:r>
+                        <a:rPr lang="en-IN"/>
+                        <a:t>2</a:t>
+                      </a:r>
+                    </a:p>
+                  </a:txBody>
+                  <a:tcPr anchor="ctr">
+                    <a:lnL w="12700" cap="flat" cmpd="sng" algn="ctr">
+                      <a:solidFill>
+                        <a:schemeClr val="tx1"/>
+                      </a:solidFill>
+                      <a:prstDash val="solid"/>
+                      <a:round/>
+                      <a:headEnd type="none" w="med" len="med"/>
+                      <a:tailEnd type="none" w="med" len="med"/>
+                    </a:lnL>
+                    <a:lnR w="12700" cap="flat" cmpd="sng" algn="ctr">
+                      <a:solidFill>
+                        <a:schemeClr val="tx1"/>
+                      </a:solidFill>
+                      <a:prstDash val="solid"/>
+                      <a:round/>
+                      <a:headEnd type="none" w="med" len="med"/>
+                      <a:tailEnd type="none" w="med" len="med"/>
+                    </a:lnR>
+                    <a:lnT w="12700" cap="flat" cmpd="sng" algn="ctr">
+                      <a:solidFill>
+                        <a:schemeClr val="tx1"/>
+                      </a:solidFill>
+                      <a:prstDash val="solid"/>
+                      <a:round/>
+                      <a:headEnd type="none" w="med" len="med"/>
+                      <a:tailEnd type="none" w="med" len="med"/>
+                    </a:lnT>
+                    <a:lnB w="12700" cap="flat" cmpd="sng" algn="ctr">
+                      <a:solidFill>
+                        <a:schemeClr val="tx1"/>
+                      </a:solidFill>
+                      <a:prstDash val="solid"/>
+                      <a:round/>
+                      <a:headEnd type="none" w="med" len="med"/>
+                      <a:tailEnd type="none" w="med" len="med"/>
+                    </a:lnB>
+                    <a:noFill/>
+                  </a:tcPr>
+                </a:tc>
+                <a:tc>
+                  <a:txBody>
+                    <a:bodyPr/>
+                    <a:lstStyle/>
+                    <a:p>
+                      <a:r>
+                        <a:rPr lang="en-IN"/>
+                        <a:t>0.52</a:t>
+                      </a:r>
+                    </a:p>
+                  </a:txBody>
+                  <a:tcPr anchor="ctr">
+                    <a:lnL w="12700" cap="flat" cmpd="sng" algn="ctr">
+                      <a:solidFill>
+                        <a:schemeClr val="tx1"/>
+                      </a:solidFill>
+                      <a:prstDash val="solid"/>
+                      <a:round/>
+                      <a:headEnd type="none" w="med" len="med"/>
+                      <a:tailEnd type="none" w="med" len="med"/>
+                    </a:lnL>
+                    <a:lnR w="12700" cap="flat" cmpd="sng" algn="ctr">
+                      <a:solidFill>
+                        <a:schemeClr val="tx1"/>
+                      </a:solidFill>
+                      <a:prstDash val="solid"/>
+                      <a:round/>
+                      <a:headEnd type="none" w="med" len="med"/>
+                      <a:tailEnd type="none" w="med" len="med"/>
+                    </a:lnR>
+                    <a:lnT w="12700" cap="flat" cmpd="sng" algn="ctr">
+                      <a:solidFill>
+                        <a:schemeClr val="tx1"/>
+                      </a:solidFill>
+                      <a:prstDash val="solid"/>
+                      <a:round/>
+                      <a:headEnd type="none" w="med" len="med"/>
+                      <a:tailEnd type="none" w="med" len="med"/>
+                    </a:lnT>
+                    <a:lnB w="12700" cap="flat" cmpd="sng" algn="ctr">
+                      <a:solidFill>
+                        <a:schemeClr val="tx1"/>
+                      </a:solidFill>
+                      <a:prstDash val="solid"/>
+                      <a:round/>
+                      <a:headEnd type="none" w="med" len="med"/>
+                      <a:tailEnd type="none" w="med" len="med"/>
+                    </a:lnB>
+                    <a:noFill/>
+                  </a:tcPr>
+                </a:tc>
+                <a:tc>
+                  <a:txBody>
+                    <a:bodyPr/>
+                    <a:lstStyle/>
+                    <a:p>
+                      <a:r>
+                        <a:rPr lang="en-IN"/>
+                        <a:t>$250k</a:t>
+                      </a:r>
+                    </a:p>
+                  </a:txBody>
+                  <a:tcPr anchor="ctr">
+                    <a:lnL w="12700" cap="flat" cmpd="sng" algn="ctr">
+                      <a:solidFill>
+                        <a:schemeClr val="tx1"/>
+                      </a:solidFill>
+                      <a:prstDash val="solid"/>
+                      <a:round/>
+                      <a:headEnd type="none" w="med" len="med"/>
+                      <a:tailEnd type="none" w="med" len="med"/>
+                    </a:lnL>
+                    <a:lnR w="12700" cap="flat" cmpd="sng" algn="ctr">
+                      <a:solidFill>
+                        <a:schemeClr val="tx1"/>
+                      </a:solidFill>
+                      <a:prstDash val="solid"/>
+                      <a:round/>
+                      <a:headEnd type="none" w="med" len="med"/>
+                      <a:tailEnd type="none" w="med" len="med"/>
+                    </a:lnR>
+                    <a:lnT w="12700" cap="flat" cmpd="sng" algn="ctr">
+                      <a:solidFill>
+                        <a:schemeClr val="tx1"/>
+                      </a:solidFill>
+                      <a:prstDash val="solid"/>
+                      <a:round/>
+                      <a:headEnd type="none" w="med" len="med"/>
+                      <a:tailEnd type="none" w="med" len="med"/>
+                    </a:lnT>
+                    <a:lnB w="12700" cap="flat" cmpd="sng" algn="ctr">
+                      <a:solidFill>
+                        <a:schemeClr val="tx1"/>
+                      </a:solidFill>
+                      <a:prstDash val="solid"/>
+                      <a:round/>
+                      <a:headEnd type="none" w="med" len="med"/>
+                      <a:tailEnd type="none" w="med" len="med"/>
+                    </a:lnB>
+                    <a:noFill/>
+                  </a:tcPr>
+                </a:tc>
+                <a:tc>
+                  <a:txBody>
+                    <a:bodyPr/>
+                    <a:lstStyle/>
+                    <a:p>
+                      <a:r>
+                        <a:rPr lang="en-IN"/>
+                        <a:t>4</a:t>
+                      </a:r>
+                    </a:p>
+                  </a:txBody>
+                  <a:tcPr anchor="ctr">
+                    <a:lnL w="12700" cap="flat" cmpd="sng" algn="ctr">
+                      <a:solidFill>
+                        <a:schemeClr val="tx1"/>
+                      </a:solidFill>
+                      <a:prstDash val="solid"/>
+                      <a:round/>
+                      <a:headEnd type="none" w="med" len="med"/>
+                      <a:tailEnd type="none" w="med" len="med"/>
+                    </a:lnL>
+                    <a:lnR w="12700" cap="flat" cmpd="sng" algn="ctr">
+                      <a:solidFill>
+                        <a:schemeClr val="tx1"/>
+                      </a:solidFill>
+                      <a:prstDash val="solid"/>
+                      <a:round/>
+                      <a:headEnd type="none" w="med" len="med"/>
+                      <a:tailEnd type="none" w="med" len="med"/>
+                    </a:lnR>
+                    <a:lnT w="12700" cap="flat" cmpd="sng" algn="ctr">
+                      <a:solidFill>
+                        <a:schemeClr val="tx1"/>
+                      </a:solidFill>
+                      <a:prstDash val="solid"/>
+                      <a:round/>
+                      <a:headEnd type="none" w="med" len="med"/>
+                      <a:tailEnd type="none" w="med" len="med"/>
+                    </a:lnT>
+                    <a:lnB w="12700" cap="flat" cmpd="sng" algn="ctr">
+                      <a:solidFill>
+                        <a:schemeClr val="tx1"/>
+                      </a:solidFill>
+                      <a:prstDash val="solid"/>
+                      <a:round/>
+                      <a:headEnd type="none" w="med" len="med"/>
+                      <a:tailEnd type="none" w="med" len="med"/>
+                    </a:lnB>
+                    <a:noFill/>
+                  </a:tcPr>
+                </a:tc>
+                <a:tc>
+                  <a:txBody>
+                    <a:bodyPr/>
+                    <a:lstStyle/>
+                    <a:p>
+                      <a:r>
+                        <a:rPr lang="en-IN"/>
+                        <a:t>1674</a:t>
+                      </a:r>
+                    </a:p>
+                  </a:txBody>
+                  <a:tcPr anchor="ctr">
+                    <a:lnL w="12700" cap="flat" cmpd="sng" algn="ctr">
+                      <a:solidFill>
+                        <a:schemeClr val="tx1"/>
+                      </a:solidFill>
+                      <a:prstDash val="solid"/>
+                      <a:round/>
+                      <a:headEnd type="none" w="med" len="med"/>
+                      <a:tailEnd type="none" w="med" len="med"/>
+                    </a:lnL>
+                    <a:lnR w="12700" cap="flat" cmpd="sng" algn="ctr">
+                      <a:solidFill>
+                        <a:schemeClr val="tx1"/>
+                      </a:solidFill>
+                      <a:prstDash val="solid"/>
+                      <a:round/>
+                      <a:headEnd type="none" w="med" len="med"/>
+                      <a:tailEnd type="none" w="med" len="med"/>
+                    </a:lnR>
+                    <a:lnT w="12700" cap="flat" cmpd="sng" algn="ctr">
+                      <a:solidFill>
+                        <a:schemeClr val="tx1"/>
+                      </a:solidFill>
+                      <a:prstDash val="solid"/>
+                      <a:round/>
+                      <a:headEnd type="none" w="med" len="med"/>
+                      <a:tailEnd type="none" w="med" len="med"/>
+                    </a:lnT>
+                    <a:lnB w="12700" cap="flat" cmpd="sng" algn="ctr">
+                      <a:solidFill>
+                        <a:schemeClr val="tx1"/>
+                      </a:solidFill>
+                      <a:prstDash val="solid"/>
+                      <a:round/>
+                      <a:headEnd type="none" w="med" len="med"/>
+                      <a:tailEnd type="none" w="med" len="med"/>
+                    </a:lnB>
+                    <a:noFill/>
+                  </a:tcPr>
+                </a:tc>
+                <a:tc>
+                  <a:txBody>
+                    <a:bodyPr/>
+                    <a:lstStyle/>
+                    <a:p>
+                      <a:r>
+                        <a:rPr lang="en-IN"/>
+                        <a:t>0.49</a:t>
+                      </a:r>
+                    </a:p>
+                  </a:txBody>
+                  <a:tcPr anchor="ctr">
+                    <a:lnL w="12700" cap="flat" cmpd="sng" algn="ctr">
+                      <a:solidFill>
+                        <a:schemeClr val="tx1"/>
+                      </a:solidFill>
+                      <a:prstDash val="solid"/>
+                      <a:round/>
+                      <a:headEnd type="none" w="med" len="med"/>
+                      <a:tailEnd type="none" w="med" len="med"/>
+                    </a:lnL>
+                    <a:lnR w="12700" cap="flat" cmpd="sng" algn="ctr">
+                      <a:solidFill>
+                        <a:schemeClr val="tx1"/>
+                      </a:solidFill>
+                      <a:prstDash val="solid"/>
+                      <a:round/>
+                      <a:headEnd type="none" w="med" len="med"/>
+                      <a:tailEnd type="none" w="med" len="med"/>
+                    </a:lnR>
+                    <a:lnT w="12700" cap="flat" cmpd="sng" algn="ctr">
+                      <a:solidFill>
+                        <a:schemeClr val="tx1"/>
+                      </a:solidFill>
+                      <a:prstDash val="solid"/>
+                      <a:round/>
+                      <a:headEnd type="none" w="med" len="med"/>
+                      <a:tailEnd type="none" w="med" len="med"/>
+                    </a:lnT>
+                    <a:lnB w="12700" cap="flat" cmpd="sng" algn="ctr">
+                      <a:solidFill>
+                        <a:schemeClr val="tx1"/>
+                      </a:solidFill>
+                      <a:prstDash val="solid"/>
+                      <a:round/>
+                      <a:headEnd type="none" w="med" len="med"/>
+                      <a:tailEnd type="none" w="med" len="med"/>
+                    </a:lnB>
+                    <a:noFill/>
+                  </a:tcPr>
+                </a:tc>
+                <a:tc>
+                  <a:txBody>
+                    <a:bodyPr/>
+                    <a:lstStyle/>
+                    <a:p>
+                      <a:r>
+                        <a:rPr lang="en-IN"/>
+                        <a:t>0.33</a:t>
+                      </a:r>
+                    </a:p>
+                  </a:txBody>
+                  <a:tcPr anchor="ctr">
+                    <a:lnL w="12700" cap="flat" cmpd="sng" algn="ctr">
+                      <a:solidFill>
+                        <a:schemeClr val="tx1"/>
+                      </a:solidFill>
+                      <a:prstDash val="solid"/>
+                      <a:round/>
+                      <a:headEnd type="none" w="med" len="med"/>
+                      <a:tailEnd type="none" w="med" len="med"/>
+                    </a:lnL>
+                    <a:lnR w="12700" cap="flat" cmpd="sng" algn="ctr">
+                      <a:solidFill>
+                        <a:schemeClr val="tx1"/>
+                      </a:solidFill>
+                      <a:prstDash val="solid"/>
+                      <a:round/>
+                      <a:headEnd type="none" w="med" len="med"/>
+                      <a:tailEnd type="none" w="med" len="med"/>
+                    </a:lnR>
+                    <a:lnT w="12700" cap="flat" cmpd="sng" algn="ctr">
+                      <a:solidFill>
+                        <a:schemeClr val="tx1"/>
+                      </a:solidFill>
+                      <a:prstDash val="solid"/>
+                      <a:round/>
+                      <a:headEnd type="none" w="med" len="med"/>
+                      <a:tailEnd type="none" w="med" len="med"/>
+                    </a:lnT>
+                    <a:lnB w="12700" cap="flat" cmpd="sng" algn="ctr">
+                      <a:solidFill>
+                        <a:schemeClr val="tx1"/>
+                      </a:solidFill>
+                      <a:prstDash val="solid"/>
+                      <a:round/>
+                      <a:headEnd type="none" w="med" len="med"/>
+                      <a:tailEnd type="none" w="med" len="med"/>
+                    </a:lnB>
+                    <a:noFill/>
+                  </a:tcPr>
+                </a:tc>
+                <a:tc>
+                  <a:txBody>
+                    <a:bodyPr/>
+                    <a:lstStyle/>
+                    <a:p>
+                      <a:r>
+                        <a:rPr lang="en-IN"/>
+                        <a:t>0.68</a:t>
+                      </a:r>
+                    </a:p>
+                  </a:txBody>
+                  <a:tcPr anchor="ctr">
+                    <a:lnL w="12700" cap="flat" cmpd="sng" algn="ctr">
+                      <a:solidFill>
+                        <a:schemeClr val="tx1"/>
+                      </a:solidFill>
+                      <a:prstDash val="solid"/>
+                      <a:round/>
+                      <a:headEnd type="none" w="med" len="med"/>
+                      <a:tailEnd type="none" w="med" len="med"/>
+                    </a:lnL>
+                    <a:lnR w="12700" cap="flat" cmpd="sng" algn="ctr">
+                      <a:solidFill>
+                        <a:schemeClr val="tx1"/>
+                      </a:solidFill>
+                      <a:prstDash val="solid"/>
+                      <a:round/>
+                      <a:headEnd type="none" w="med" len="med"/>
+                      <a:tailEnd type="none" w="med" len="med"/>
+                    </a:lnR>
+                    <a:lnT w="12700" cap="flat" cmpd="sng" algn="ctr">
+                      <a:solidFill>
+                        <a:schemeClr val="tx1"/>
+                      </a:solidFill>
+                      <a:prstDash val="solid"/>
+                      <a:round/>
+                      <a:headEnd type="none" w="med" len="med"/>
+                      <a:tailEnd type="none" w="med" len="med"/>
+                    </a:lnT>
+                    <a:lnB w="12700" cap="flat" cmpd="sng" algn="ctr">
+                      <a:solidFill>
+                        <a:schemeClr val="tx1"/>
+                      </a:solidFill>
+                      <a:prstDash val="solid"/>
+                      <a:round/>
+                      <a:headEnd type="none" w="med" len="med"/>
+                      <a:tailEnd type="none" w="med" len="med"/>
+                    </a:lnB>
+                    <a:noFill/>
+                  </a:tcPr>
+                </a:tc>
+                <a:tc>
+                  <a:txBody>
+                    <a:bodyPr/>
+                    <a:lstStyle/>
+                    <a:p>
+                      <a:r>
+                        <a:rPr lang="en-IN" dirty="0"/>
+                        <a:t>1.00</a:t>
+                      </a:r>
+                    </a:p>
+                  </a:txBody>
+                  <a:tcPr anchor="ctr">
+                    <a:lnL w="12700" cap="flat" cmpd="sng" algn="ctr">
+                      <a:solidFill>
+                        <a:schemeClr val="tx1"/>
+                      </a:solidFill>
+                      <a:prstDash val="solid"/>
+                      <a:round/>
+                      <a:headEnd type="none" w="med" len="med"/>
+                      <a:tailEnd type="none" w="med" len="med"/>
+                    </a:lnL>
+                    <a:lnR w="12700" cap="flat" cmpd="sng" algn="ctr">
+                      <a:solidFill>
+                        <a:schemeClr val="tx1"/>
+                      </a:solidFill>
+                      <a:prstDash val="solid"/>
+                      <a:round/>
+                      <a:headEnd type="none" w="med" len="med"/>
+                      <a:tailEnd type="none" w="med" len="med"/>
+                    </a:lnR>
+                    <a:lnT w="12700" cap="flat" cmpd="sng" algn="ctr">
+                      <a:solidFill>
+                        <a:schemeClr val="tx1"/>
+                      </a:solidFill>
+                      <a:prstDash val="solid"/>
+                      <a:round/>
+                      <a:headEnd type="none" w="med" len="med"/>
+                      <a:tailEnd type="none" w="med" len="med"/>
+                    </a:lnT>
+                    <a:lnB w="12700" cap="flat" cmpd="sng" algn="ctr">
+                      <a:solidFill>
+                        <a:schemeClr val="tx1"/>
+                      </a:solidFill>
+                      <a:prstDash val="solid"/>
+                      <a:round/>
+                      <a:headEnd type="none" w="med" len="med"/>
+                      <a:tailEnd type="none" w="med" len="med"/>
+                    </a:lnB>
+                    <a:noFill/>
+                  </a:tcPr>
+                </a:tc>
+                <a:extLst>
+                  <a:ext uri="{0D108BD9-81ED-4DB2-BD59-A6C34878D82A}">
+                    <a16:rowId xmlns:a16="http://schemas.microsoft.com/office/drawing/2014/main" val="3026979745"/>
+                  </a:ext>
+                </a:extLst>
+              </a:tr>
+            </a:tbl>
+          </a:graphicData>
+        </a:graphic>
+      </p:graphicFrame>
+    </p:spTree>
+    <p:extLst>
+      <p:ext uri="{BB962C8B-B14F-4D97-AF65-F5344CB8AC3E}">
+        <p14:creationId xmlns:p14="http://schemas.microsoft.com/office/powerpoint/2010/main" val="3578910996"/>
+      </p:ext>
+    </p:extLst>
+  </p:cSld>
+  <p:clrMapOvr>
+    <a:masterClrMapping/>
+  </p:clrMapOvr>
+</p:sld>
+</file>
+
+<file path=ppt/slides/slide9.xml><?xml version="1.0" encoding="utf-8"?>
+<p:sld xmlns:a="http://schemas.openxmlformats.org/drawingml/2006/main" xmlns:r="http://schemas.openxmlformats.org/officeDocument/2006/relationships" xmlns:p="http://schemas.openxmlformats.org/presentationml/2006/main">
+  <p:cSld>
+    <p:spTree>
+      <p:nvGrpSpPr>
+        <p:cNvPr id="1" name="">
+          <a:extLst>
+            <a:ext uri="{FF2B5EF4-FFF2-40B4-BE49-F238E27FC236}">
+              <a16:creationId xmlns:a16="http://schemas.microsoft.com/office/drawing/2014/main" id="{DD9ED4AB-9A04-D316-CB9A-F2991CD2B959}"/>
+            </a:ext>
+          </a:extLst>
+        </p:cNvPr>
+        <p:cNvGrpSpPr/>
+        <p:nvPr/>
+      </p:nvGrpSpPr>
+      <p:grpSpPr>
+        <a:xfrm>
+          <a:off x="0" y="0"/>
+          <a:ext cx="0" cy="0"/>
+          <a:chOff x="0" y="0"/>
+          <a:chExt cx="0" cy="0"/>
+        </a:xfrm>
+      </p:grpSpPr>
+      <p:sp>
+        <p:nvSpPr>
+          <p:cNvPr id="2" name="Title 1">
+            <a:extLst>
+              <a:ext uri="{FF2B5EF4-FFF2-40B4-BE49-F238E27FC236}">
+                <a16:creationId xmlns:a16="http://schemas.microsoft.com/office/drawing/2014/main" id="{3FDD8078-555B-71E3-A147-FE4D9CADEEB2}"/>
+              </a:ext>
+            </a:extLst>
+          </p:cNvPr>
+          <p:cNvSpPr>
+            <a:spLocks noGrp="1"/>
+          </p:cNvSpPr>
+          <p:nvPr>
+            <p:ph type="title"/>
+          </p:nvPr>
+        </p:nvSpPr>
+        <p:spPr/>
+        <p:txBody>
+          <a:bodyPr/>
+          <a:lstStyle/>
+          <a:p>
+            <a:r>
+              <a:rPr lang="en-IN" dirty="0">
+                <a:latin typeface="Times New Roman" panose="02020603050405020304" pitchFamily="18" charset="0"/>
+                <a:cs typeface="Times New Roman" panose="02020603050405020304" pitchFamily="18" charset="0"/>
+              </a:rPr>
+              <a:t>Challenges &amp; Trade-offs</a:t>
+            </a:r>
+            <a:endParaRPr lang="en-US" dirty="0">
+              <a:latin typeface="Times New Roman" panose="02020603050405020304" pitchFamily="18" charset="0"/>
+              <a:cs typeface="Times New Roman" panose="02020603050405020304" pitchFamily="18" charset="0"/>
+            </a:endParaRPr>
+          </a:p>
+        </p:txBody>
+      </p:sp>
+      <p:sp>
+        <p:nvSpPr>
+          <p:cNvPr id="3" name="Content Placeholder 2">
+            <a:extLst>
+              <a:ext uri="{FF2B5EF4-FFF2-40B4-BE49-F238E27FC236}">
+                <a16:creationId xmlns:a16="http://schemas.microsoft.com/office/drawing/2014/main" id="{B9F1558D-E4FD-02A2-B735-8F1528000426}"/>
+              </a:ext>
+            </a:extLst>
+          </p:cNvPr>
+          <p:cNvSpPr>
+            <a:spLocks noGrp="1"/>
+          </p:cNvSpPr>
+          <p:nvPr>
+            <p:ph idx="1"/>
+          </p:nvPr>
+        </p:nvSpPr>
+        <p:spPr>
+          <a:xfrm>
+            <a:off x="838200" y="1798046"/>
+            <a:ext cx="10515600" cy="4493026"/>
+          </a:xfrm>
+        </p:spPr>
+        <p:txBody>
+          <a:bodyPr>
+            <a:noAutofit/>
+          </a:bodyPr>
+          <a:lstStyle/>
+          <a:p>
+            <a:pPr marL="342900" indent="-342900">
+              <a:buAutoNum type="arabicPeriod"/>
+            </a:pPr>
+            <a:r>
+              <a:rPr lang="en-IN" sz="1800" dirty="0">
+                <a:latin typeface="Times New Roman" panose="02020603050405020304" pitchFamily="18" charset="0"/>
+                <a:cs typeface="Times New Roman" panose="02020603050405020304" pitchFamily="18" charset="0"/>
+              </a:rPr>
+              <a:t>Semantic leakage in text embeddings.</a:t>
+            </a:r>
+          </a:p>
+          <a:p>
+            <a:pPr marL="0" indent="0">
+              <a:buNone/>
+            </a:pPr>
+            <a:r>
+              <a:rPr lang="en-IN" sz="1200" dirty="0">
+                <a:latin typeface="Times New Roman" panose="02020603050405020304" pitchFamily="18" charset="0"/>
+                <a:cs typeface="Times New Roman" panose="02020603050405020304" pitchFamily="18" charset="0"/>
+              </a:rPr>
+              <a:t>         - Semantic leakage in text similarity (e.g., lake vs mountain)</a:t>
+            </a:r>
+          </a:p>
+          <a:p>
+            <a:pPr marL="0" indent="0">
+              <a:buNone/>
+            </a:pPr>
+            <a:r>
+              <a:rPr lang="en-IN" sz="1200" dirty="0">
+                <a:latin typeface="Times New Roman" panose="02020603050405020304" pitchFamily="18" charset="0"/>
+                <a:cs typeface="Times New Roman" panose="02020603050405020304" pitchFamily="18" charset="0"/>
+              </a:rPr>
+              <a:t>         - Pretrained embeddings may align semantically similar but contextually different preferences.</a:t>
+            </a:r>
+          </a:p>
+          <a:p>
+            <a:pPr marL="342900" indent="-342900">
+              <a:buAutoNum type="arabicPeriod"/>
+            </a:pPr>
+            <a:endParaRPr lang="en-IN" sz="1800" dirty="0">
+              <a:latin typeface="Times New Roman" panose="02020603050405020304" pitchFamily="18" charset="0"/>
+              <a:cs typeface="Times New Roman" panose="02020603050405020304" pitchFamily="18" charset="0"/>
+            </a:endParaRPr>
+          </a:p>
+          <a:p>
+            <a:pPr marL="0" indent="0">
+              <a:buNone/>
+            </a:pPr>
+            <a:r>
+              <a:rPr lang="en-IN" sz="1800" dirty="0">
+                <a:latin typeface="Times New Roman" panose="02020603050405020304" pitchFamily="18" charset="0"/>
+                <a:cs typeface="Times New Roman" panose="02020603050405020304" pitchFamily="18" charset="0"/>
+              </a:rPr>
+              <a:t>2.   No user feedback loop</a:t>
+            </a:r>
+          </a:p>
+          <a:p>
+            <a:pPr marL="0" indent="0">
+              <a:buNone/>
+            </a:pPr>
+            <a:r>
+              <a:rPr lang="en-IN" sz="1000" dirty="0"/>
+              <a:t>      </a:t>
+            </a:r>
+            <a:r>
+              <a:rPr lang="en-IN" sz="1200" dirty="0">
+                <a:latin typeface="Times New Roman" panose="02020603050405020304" pitchFamily="18" charset="0"/>
+                <a:cs typeface="Times New Roman" panose="02020603050405020304" pitchFamily="18" charset="0"/>
+              </a:rPr>
+              <a:t>    - Rankings are not updated based on clicks, selections, or rejections.</a:t>
+            </a:r>
+          </a:p>
+          <a:p>
+            <a:pPr marL="0" indent="0">
+              <a:buNone/>
+            </a:pPr>
+            <a:endParaRPr lang="en-IN" sz="1200" dirty="0">
+              <a:latin typeface="Times New Roman" panose="02020603050405020304" pitchFamily="18" charset="0"/>
+              <a:cs typeface="Times New Roman" panose="02020603050405020304" pitchFamily="18" charset="0"/>
+            </a:endParaRPr>
+          </a:p>
+          <a:p>
+            <a:pPr marL="342900" indent="-342900">
+              <a:buAutoNum type="arabicPeriod" startAt="3"/>
+            </a:pPr>
+            <a:r>
+              <a:rPr lang="en-IN" sz="1800" dirty="0">
+                <a:latin typeface="Times New Roman" panose="02020603050405020304" pitchFamily="18" charset="0"/>
+                <a:cs typeface="Times New Roman" panose="02020603050405020304" pitchFamily="18" charset="0"/>
+              </a:rPr>
+              <a:t>No explicit location grounding</a:t>
+            </a:r>
+          </a:p>
+          <a:p>
+            <a:pPr marL="0" indent="0">
+              <a:buNone/>
+            </a:pPr>
+            <a:r>
+              <a:rPr lang="en-IN" sz="1800" dirty="0">
+                <a:latin typeface="Times New Roman" panose="02020603050405020304" pitchFamily="18" charset="0"/>
+                <a:cs typeface="Times New Roman" panose="02020603050405020304" pitchFamily="18" charset="0"/>
+              </a:rPr>
+              <a:t>      - </a:t>
+            </a:r>
+            <a:r>
+              <a:rPr lang="en-IN" sz="1200" dirty="0">
+                <a:latin typeface="Times New Roman" panose="02020603050405020304" pitchFamily="18" charset="0"/>
+                <a:cs typeface="Times New Roman" panose="02020603050405020304" pitchFamily="18" charset="0"/>
+              </a:rPr>
+              <a:t>Location preferences are inferred indirectly from price, text, and amenities.</a:t>
+            </a:r>
+          </a:p>
+          <a:p>
+            <a:pPr marL="0" indent="0">
+              <a:buNone/>
+            </a:pPr>
+            <a:endParaRPr lang="en-IN" sz="1800" dirty="0">
+              <a:latin typeface="Times New Roman" panose="02020603050405020304" pitchFamily="18" charset="0"/>
+              <a:cs typeface="Times New Roman" panose="02020603050405020304" pitchFamily="18" charset="0"/>
+            </a:endParaRPr>
+          </a:p>
+          <a:p>
+            <a:pPr marL="342900" indent="-342900">
+              <a:buAutoNum type="arabicPeriod" startAt="4"/>
+            </a:pPr>
+            <a:r>
+              <a:rPr lang="en-IN" sz="1800" dirty="0">
+                <a:latin typeface="Times New Roman" panose="02020603050405020304" pitchFamily="18" charset="0"/>
+                <a:cs typeface="Times New Roman" panose="02020603050405020304" pitchFamily="18" charset="0"/>
+              </a:rPr>
+              <a:t>Deterministic weights</a:t>
+            </a:r>
+          </a:p>
+          <a:p>
+            <a:pPr marL="0" indent="0">
+              <a:buNone/>
+            </a:pPr>
+            <a:r>
+              <a:rPr lang="en-IN" sz="1800" dirty="0">
+                <a:latin typeface="Times New Roman" panose="02020603050405020304" pitchFamily="18" charset="0"/>
+                <a:cs typeface="Times New Roman" panose="02020603050405020304" pitchFamily="18" charset="0"/>
+              </a:rPr>
+              <a:t>      - </a:t>
+            </a:r>
+            <a:r>
+              <a:rPr lang="en-IN" sz="1200" dirty="0"/>
+              <a:t>Weights reflect design intent rather than learned optimization.</a:t>
+            </a:r>
+            <a:endParaRPr lang="en-IN" sz="1800" dirty="0">
+              <a:latin typeface="Times New Roman" panose="02020603050405020304" pitchFamily="18" charset="0"/>
+              <a:cs typeface="Times New Roman" panose="02020603050405020304" pitchFamily="18" charset="0"/>
+            </a:endParaRPr>
+          </a:p>
+        </p:txBody>
+      </p:sp>
+    </p:spTree>
+    <p:extLst>
+      <p:ext uri="{BB962C8B-B14F-4D97-AF65-F5344CB8AC3E}">
+        <p14:creationId xmlns:p14="http://schemas.microsoft.com/office/powerpoint/2010/main" val="3520494974"/>
       </p:ext>
     </p:extLst>
   </p:cSld>

</xml_diff>